<commit_message>
ml types, rl intro
</commit_message>
<xml_diff>
--- a/From RL to DRL.pptx
+++ b/From RL to DRL.pptx
@@ -4,6 +4,9 @@
   <p:sldMasterIdLst>
     <p:sldMasterId id="2147483708" r:id="rId1"/>
   </p:sldMasterIdLst>
+  <p:notesMasterIdLst>
+    <p:notesMasterId r:id="rId11"/>
+  </p:notesMasterIdLst>
   <p:sldIdLst>
     <p:sldId id="256" r:id="rId2"/>
     <p:sldId id="257" r:id="rId3"/>
@@ -13,6 +16,7 @@
     <p:sldId id="261" r:id="rId7"/>
     <p:sldId id="262" r:id="rId8"/>
     <p:sldId id="263" r:id="rId9"/>
+    <p:sldId id="264" r:id="rId10"/>
   </p:sldIdLst>
   <p:sldSz cx="12192000" cy="6858000"/>
   <p:notesSz cx="6858000" cy="9144000"/>
@@ -117,6 +121,2321 @@
     </p:ext>
   </p:extLst>
 </p:presentation>
+</file>
+
+<file path=ppt/notesMasters/notesMaster1.xml><?xml version="1.0" encoding="utf-8"?>
+<p:notesMaster xmlns:a="http://schemas.openxmlformats.org/drawingml/2006/main" xmlns:r="http://schemas.openxmlformats.org/officeDocument/2006/relationships" xmlns:p="http://schemas.openxmlformats.org/presentationml/2006/main">
+  <p:cSld>
+    <p:bg>
+      <p:bgRef idx="1001">
+        <a:schemeClr val="bg1"/>
+      </p:bgRef>
+    </p:bg>
+    <p:spTree>
+      <p:nvGrpSpPr>
+        <p:cNvPr id="1" name=""/>
+        <p:cNvGrpSpPr/>
+        <p:nvPr/>
+      </p:nvGrpSpPr>
+      <p:grpSpPr>
+        <a:xfrm>
+          <a:off x="0" y="0"/>
+          <a:ext cx="0" cy="0"/>
+          <a:chOff x="0" y="0"/>
+          <a:chExt cx="0" cy="0"/>
+        </a:xfrm>
+      </p:grpSpPr>
+      <p:sp>
+        <p:nvSpPr>
+          <p:cNvPr id="2" name="Header Placeholder 1"/>
+          <p:cNvSpPr>
+            <a:spLocks noGrp="1"/>
+          </p:cNvSpPr>
+          <p:nvPr>
+            <p:ph type="hdr" sz="quarter"/>
+          </p:nvPr>
+        </p:nvSpPr>
+        <p:spPr>
+          <a:xfrm>
+            <a:off x="0" y="0"/>
+            <a:ext cx="2971800" cy="458788"/>
+          </a:xfrm>
+          <a:prstGeom prst="rect">
+            <a:avLst/>
+          </a:prstGeom>
+        </p:spPr>
+        <p:txBody>
+          <a:bodyPr vert="horz" lIns="91440" tIns="45720" rIns="91440" bIns="45720" rtlCol="0"/>
+          <a:lstStyle>
+            <a:lvl1pPr algn="l">
+              <a:defRPr sz="1200"/>
+            </a:lvl1pPr>
+          </a:lstStyle>
+          <a:p>
+            <a:endParaRPr lang="en-US"/>
+          </a:p>
+        </p:txBody>
+      </p:sp>
+      <p:sp>
+        <p:nvSpPr>
+          <p:cNvPr id="3" name="Date Placeholder 2"/>
+          <p:cNvSpPr>
+            <a:spLocks noGrp="1"/>
+          </p:cNvSpPr>
+          <p:nvPr>
+            <p:ph type="dt" idx="1"/>
+          </p:nvPr>
+        </p:nvSpPr>
+        <p:spPr>
+          <a:xfrm>
+            <a:off x="3884613" y="0"/>
+            <a:ext cx="2971800" cy="458788"/>
+          </a:xfrm>
+          <a:prstGeom prst="rect">
+            <a:avLst/>
+          </a:prstGeom>
+        </p:spPr>
+        <p:txBody>
+          <a:bodyPr vert="horz" lIns="91440" tIns="45720" rIns="91440" bIns="45720" rtlCol="0"/>
+          <a:lstStyle>
+            <a:lvl1pPr algn="r">
+              <a:defRPr sz="1200"/>
+            </a:lvl1pPr>
+          </a:lstStyle>
+          <a:p>
+            <a:fld id="{1C1499B0-46DF-4199-B267-25F771D8AF1C}" type="datetimeFigureOut">
+              <a:rPr lang="en-US" smtClean="0"/>
+              <a:t>12/11/2019</a:t>
+            </a:fld>
+            <a:endParaRPr lang="en-US"/>
+          </a:p>
+        </p:txBody>
+      </p:sp>
+      <p:sp>
+        <p:nvSpPr>
+          <p:cNvPr id="4" name="Slide Image Placeholder 3"/>
+          <p:cNvSpPr>
+            <a:spLocks noGrp="1" noRot="1" noChangeAspect="1"/>
+          </p:cNvSpPr>
+          <p:nvPr>
+            <p:ph type="sldImg" idx="2"/>
+          </p:nvPr>
+        </p:nvSpPr>
+        <p:spPr>
+          <a:xfrm>
+            <a:off x="685800" y="1143000"/>
+            <a:ext cx="5486400" cy="3086100"/>
+          </a:xfrm>
+          <a:prstGeom prst="rect">
+            <a:avLst/>
+          </a:prstGeom>
+          <a:noFill/>
+          <a:ln w="12700">
+            <a:solidFill>
+              <a:prstClr val="black"/>
+            </a:solidFill>
+          </a:ln>
+        </p:spPr>
+        <p:txBody>
+          <a:bodyPr vert="horz" lIns="91440" tIns="45720" rIns="91440" bIns="45720" rtlCol="0" anchor="ctr"/>
+          <a:lstStyle/>
+          <a:p>
+            <a:endParaRPr lang="en-US"/>
+          </a:p>
+        </p:txBody>
+      </p:sp>
+      <p:sp>
+        <p:nvSpPr>
+          <p:cNvPr id="5" name="Notes Placeholder 4"/>
+          <p:cNvSpPr>
+            <a:spLocks noGrp="1"/>
+          </p:cNvSpPr>
+          <p:nvPr>
+            <p:ph type="body" sz="quarter" idx="3"/>
+          </p:nvPr>
+        </p:nvSpPr>
+        <p:spPr>
+          <a:xfrm>
+            <a:off x="685800" y="4400550"/>
+            <a:ext cx="5486400" cy="3600450"/>
+          </a:xfrm>
+          <a:prstGeom prst="rect">
+            <a:avLst/>
+          </a:prstGeom>
+        </p:spPr>
+        <p:txBody>
+          <a:bodyPr vert="horz" lIns="91440" tIns="45720" rIns="91440" bIns="45720" rtlCol="0"/>
+          <a:lstStyle/>
+          <a:p>
+            <a:pPr lvl="0"/>
+            <a:r>
+              <a:rPr lang="en-US"/>
+              <a:t>Click to edit Master text styles</a:t>
+            </a:r>
+          </a:p>
+          <a:p>
+            <a:pPr lvl="1"/>
+            <a:r>
+              <a:rPr lang="en-US"/>
+              <a:t>Second level</a:t>
+            </a:r>
+          </a:p>
+          <a:p>
+            <a:pPr lvl="2"/>
+            <a:r>
+              <a:rPr lang="en-US"/>
+              <a:t>Third level</a:t>
+            </a:r>
+          </a:p>
+          <a:p>
+            <a:pPr lvl="3"/>
+            <a:r>
+              <a:rPr lang="en-US"/>
+              <a:t>Fourth level</a:t>
+            </a:r>
+          </a:p>
+          <a:p>
+            <a:pPr lvl="4"/>
+            <a:r>
+              <a:rPr lang="en-US"/>
+              <a:t>Fifth level</a:t>
+            </a:r>
+          </a:p>
+        </p:txBody>
+      </p:sp>
+      <p:sp>
+        <p:nvSpPr>
+          <p:cNvPr id="6" name="Footer Placeholder 5"/>
+          <p:cNvSpPr>
+            <a:spLocks noGrp="1"/>
+          </p:cNvSpPr>
+          <p:nvPr>
+            <p:ph type="ftr" sz="quarter" idx="4"/>
+          </p:nvPr>
+        </p:nvSpPr>
+        <p:spPr>
+          <a:xfrm>
+            <a:off x="0" y="8685213"/>
+            <a:ext cx="2971800" cy="458787"/>
+          </a:xfrm>
+          <a:prstGeom prst="rect">
+            <a:avLst/>
+          </a:prstGeom>
+        </p:spPr>
+        <p:txBody>
+          <a:bodyPr vert="horz" lIns="91440" tIns="45720" rIns="91440" bIns="45720" rtlCol="0" anchor="b"/>
+          <a:lstStyle>
+            <a:lvl1pPr algn="l">
+              <a:defRPr sz="1200"/>
+            </a:lvl1pPr>
+          </a:lstStyle>
+          <a:p>
+            <a:endParaRPr lang="en-US"/>
+          </a:p>
+        </p:txBody>
+      </p:sp>
+      <p:sp>
+        <p:nvSpPr>
+          <p:cNvPr id="7" name="Slide Number Placeholder 6"/>
+          <p:cNvSpPr>
+            <a:spLocks noGrp="1"/>
+          </p:cNvSpPr>
+          <p:nvPr>
+            <p:ph type="sldNum" sz="quarter" idx="5"/>
+          </p:nvPr>
+        </p:nvSpPr>
+        <p:spPr>
+          <a:xfrm>
+            <a:off x="3884613" y="8685213"/>
+            <a:ext cx="2971800" cy="458787"/>
+          </a:xfrm>
+          <a:prstGeom prst="rect">
+            <a:avLst/>
+          </a:prstGeom>
+        </p:spPr>
+        <p:txBody>
+          <a:bodyPr vert="horz" lIns="91440" tIns="45720" rIns="91440" bIns="45720" rtlCol="0" anchor="b"/>
+          <a:lstStyle>
+            <a:lvl1pPr algn="r">
+              <a:defRPr sz="1200"/>
+            </a:lvl1pPr>
+          </a:lstStyle>
+          <a:p>
+            <a:fld id="{1980DC7F-660A-4453-9840-44DB0AF8652B}" type="slidenum">
+              <a:rPr lang="en-US" smtClean="0"/>
+              <a:t>‹#›</a:t>
+            </a:fld>
+            <a:endParaRPr lang="en-US"/>
+          </a:p>
+        </p:txBody>
+      </p:sp>
+    </p:spTree>
+    <p:extLst>
+      <p:ext uri="{BB962C8B-B14F-4D97-AF65-F5344CB8AC3E}">
+        <p14:creationId xmlns:p14="http://schemas.microsoft.com/office/powerpoint/2010/main" val="2490028306"/>
+      </p:ext>
+    </p:extLst>
+  </p:cSld>
+  <p:clrMap bg1="lt1" tx1="dk1" bg2="lt2" tx2="dk2" accent1="accent1" accent2="accent2" accent3="accent3" accent4="accent4" accent5="accent5" accent6="accent6" hlink="hlink" folHlink="folHlink"/>
+  <p:notesStyle>
+    <a:lvl1pPr marL="0" algn="l" defTabSz="914400" rtl="0" eaLnBrk="1" latinLnBrk="0" hangingPunct="1">
+      <a:defRPr sz="1200" kern="1200">
+        <a:solidFill>
+          <a:schemeClr val="tx1"/>
+        </a:solidFill>
+        <a:latin typeface="+mn-lt"/>
+        <a:ea typeface="+mn-ea"/>
+        <a:cs typeface="+mn-cs"/>
+      </a:defRPr>
+    </a:lvl1pPr>
+    <a:lvl2pPr marL="457200" algn="l" defTabSz="914400" rtl="0" eaLnBrk="1" latinLnBrk="0" hangingPunct="1">
+      <a:defRPr sz="1200" kern="1200">
+        <a:solidFill>
+          <a:schemeClr val="tx1"/>
+        </a:solidFill>
+        <a:latin typeface="+mn-lt"/>
+        <a:ea typeface="+mn-ea"/>
+        <a:cs typeface="+mn-cs"/>
+      </a:defRPr>
+    </a:lvl2pPr>
+    <a:lvl3pPr marL="914400" algn="l" defTabSz="914400" rtl="0" eaLnBrk="1" latinLnBrk="0" hangingPunct="1">
+      <a:defRPr sz="1200" kern="1200">
+        <a:solidFill>
+          <a:schemeClr val="tx1"/>
+        </a:solidFill>
+        <a:latin typeface="+mn-lt"/>
+        <a:ea typeface="+mn-ea"/>
+        <a:cs typeface="+mn-cs"/>
+      </a:defRPr>
+    </a:lvl3pPr>
+    <a:lvl4pPr marL="1371600" algn="l" defTabSz="914400" rtl="0" eaLnBrk="1" latinLnBrk="0" hangingPunct="1">
+      <a:defRPr sz="1200" kern="1200">
+        <a:solidFill>
+          <a:schemeClr val="tx1"/>
+        </a:solidFill>
+        <a:latin typeface="+mn-lt"/>
+        <a:ea typeface="+mn-ea"/>
+        <a:cs typeface="+mn-cs"/>
+      </a:defRPr>
+    </a:lvl4pPr>
+    <a:lvl5pPr marL="1828800" algn="l" defTabSz="914400" rtl="0" eaLnBrk="1" latinLnBrk="0" hangingPunct="1">
+      <a:defRPr sz="1200" kern="1200">
+        <a:solidFill>
+          <a:schemeClr val="tx1"/>
+        </a:solidFill>
+        <a:latin typeface="+mn-lt"/>
+        <a:ea typeface="+mn-ea"/>
+        <a:cs typeface="+mn-cs"/>
+      </a:defRPr>
+    </a:lvl5pPr>
+    <a:lvl6pPr marL="2286000" algn="l" defTabSz="914400" rtl="0" eaLnBrk="1" latinLnBrk="0" hangingPunct="1">
+      <a:defRPr sz="1200" kern="1200">
+        <a:solidFill>
+          <a:schemeClr val="tx1"/>
+        </a:solidFill>
+        <a:latin typeface="+mn-lt"/>
+        <a:ea typeface="+mn-ea"/>
+        <a:cs typeface="+mn-cs"/>
+      </a:defRPr>
+    </a:lvl6pPr>
+    <a:lvl7pPr marL="2743200" algn="l" defTabSz="914400" rtl="0" eaLnBrk="1" latinLnBrk="0" hangingPunct="1">
+      <a:defRPr sz="1200" kern="1200">
+        <a:solidFill>
+          <a:schemeClr val="tx1"/>
+        </a:solidFill>
+        <a:latin typeface="+mn-lt"/>
+        <a:ea typeface="+mn-ea"/>
+        <a:cs typeface="+mn-cs"/>
+      </a:defRPr>
+    </a:lvl7pPr>
+    <a:lvl8pPr marL="3200400" algn="l" defTabSz="914400" rtl="0" eaLnBrk="1" latinLnBrk="0" hangingPunct="1">
+      <a:defRPr sz="1200" kern="1200">
+        <a:solidFill>
+          <a:schemeClr val="tx1"/>
+        </a:solidFill>
+        <a:latin typeface="+mn-lt"/>
+        <a:ea typeface="+mn-ea"/>
+        <a:cs typeface="+mn-cs"/>
+      </a:defRPr>
+    </a:lvl8pPr>
+    <a:lvl9pPr marL="3657600" algn="l" defTabSz="914400" rtl="0" eaLnBrk="1" latinLnBrk="0" hangingPunct="1">
+      <a:defRPr sz="1200" kern="1200">
+        <a:solidFill>
+          <a:schemeClr val="tx1"/>
+        </a:solidFill>
+        <a:latin typeface="+mn-lt"/>
+        <a:ea typeface="+mn-ea"/>
+        <a:cs typeface="+mn-cs"/>
+      </a:defRPr>
+    </a:lvl9pPr>
+  </p:notesStyle>
+</p:notesMaster>
+</file>
+
+<file path=ppt/notesSlides/notesSlide1.xml><?xml version="1.0" encoding="utf-8"?>
+<p:notes xmlns:a="http://schemas.openxmlformats.org/drawingml/2006/main" xmlns:r="http://schemas.openxmlformats.org/officeDocument/2006/relationships" xmlns:p="http://schemas.openxmlformats.org/presentationml/2006/main">
+  <p:cSld>
+    <p:spTree>
+      <p:nvGrpSpPr>
+        <p:cNvPr id="1" name=""/>
+        <p:cNvGrpSpPr/>
+        <p:nvPr/>
+      </p:nvGrpSpPr>
+      <p:grpSpPr>
+        <a:xfrm>
+          <a:off x="0" y="0"/>
+          <a:ext cx="0" cy="0"/>
+          <a:chOff x="0" y="0"/>
+          <a:chExt cx="0" cy="0"/>
+        </a:xfrm>
+      </p:grpSpPr>
+      <p:sp>
+        <p:nvSpPr>
+          <p:cNvPr id="2" name="Slide Image Placeholder 1"/>
+          <p:cNvSpPr>
+            <a:spLocks noGrp="1" noRot="1" noChangeAspect="1"/>
+          </p:cNvSpPr>
+          <p:nvPr>
+            <p:ph type="sldImg"/>
+          </p:nvPr>
+        </p:nvSpPr>
+        <p:spPr/>
+      </p:sp>
+      <p:sp>
+        <p:nvSpPr>
+          <p:cNvPr id="3" name="Notes Placeholder 2"/>
+          <p:cNvSpPr>
+            <a:spLocks noGrp="1"/>
+          </p:cNvSpPr>
+          <p:nvPr>
+            <p:ph type="body" idx="1"/>
+          </p:nvPr>
+        </p:nvSpPr>
+        <p:spPr/>
+        <p:txBody>
+          <a:bodyPr/>
+          <a:lstStyle/>
+          <a:p>
+            <a:r>
+              <a:rPr lang="en-US" sz="1200" b="0" i="0" kern="1200" dirty="0">
+                <a:solidFill>
+                  <a:schemeClr val="tx1"/>
+                </a:solidFill>
+                <a:effectLst/>
+                <a:latin typeface="+mn-lt"/>
+                <a:ea typeface="+mn-ea"/>
+                <a:cs typeface="+mn-cs"/>
+              </a:rPr>
+              <a:t>The terms supervised learning and unsupervised learning would seem</a:t>
+            </a:r>
+            <a:br>
+              <a:rPr lang="en-US" sz="1200" b="0" i="0" kern="1200" dirty="0">
+                <a:solidFill>
+                  <a:schemeClr val="tx1"/>
+                </a:solidFill>
+                <a:effectLst/>
+                <a:latin typeface="+mn-lt"/>
+                <a:ea typeface="+mn-ea"/>
+                <a:cs typeface="+mn-cs"/>
+              </a:rPr>
+            </a:br>
+            <a:r>
+              <a:rPr lang="en-US" sz="1200" b="0" i="0" kern="1200" dirty="0">
+                <a:solidFill>
+                  <a:schemeClr val="tx1"/>
+                </a:solidFill>
+                <a:effectLst/>
+                <a:latin typeface="+mn-lt"/>
+                <a:ea typeface="+mn-ea"/>
+                <a:cs typeface="+mn-cs"/>
+              </a:rPr>
+              <a:t>to exhaustively classify machine learning paradigms, but they do not.</a:t>
+            </a:r>
+            <a:r>
+              <a:rPr lang="en-US" dirty="0"/>
+              <a:t> </a:t>
+            </a:r>
+            <a:br>
+              <a:rPr lang="en-US" dirty="0"/>
+            </a:br>
+            <a:endParaRPr lang="en-US" dirty="0"/>
+          </a:p>
+        </p:txBody>
+      </p:sp>
+      <p:sp>
+        <p:nvSpPr>
+          <p:cNvPr id="4" name="Slide Number Placeholder 3"/>
+          <p:cNvSpPr>
+            <a:spLocks noGrp="1"/>
+          </p:cNvSpPr>
+          <p:nvPr>
+            <p:ph type="sldNum" sz="quarter" idx="5"/>
+          </p:nvPr>
+        </p:nvSpPr>
+        <p:spPr/>
+        <p:txBody>
+          <a:bodyPr/>
+          <a:lstStyle/>
+          <a:p>
+            <a:fld id="{1980DC7F-660A-4453-9840-44DB0AF8652B}" type="slidenum">
+              <a:rPr lang="en-US" smtClean="0"/>
+              <a:t>7</a:t>
+            </a:fld>
+            <a:endParaRPr lang="en-US"/>
+          </a:p>
+        </p:txBody>
+      </p:sp>
+    </p:spTree>
+    <p:extLst>
+      <p:ext uri="{BB962C8B-B14F-4D97-AF65-F5344CB8AC3E}">
+        <p14:creationId xmlns:p14="http://schemas.microsoft.com/office/powerpoint/2010/main" val="1322436427"/>
+      </p:ext>
+    </p:extLst>
+  </p:cSld>
+  <p:clrMapOvr>
+    <a:masterClrMapping/>
+  </p:clrMapOvr>
+</p:notes>
+</file>
+
+<file path=ppt/notesSlides/notesSlide2.xml><?xml version="1.0" encoding="utf-8"?>
+<p:notes xmlns:a="http://schemas.openxmlformats.org/drawingml/2006/main" xmlns:r="http://schemas.openxmlformats.org/officeDocument/2006/relationships" xmlns:p="http://schemas.openxmlformats.org/presentationml/2006/main">
+  <p:cSld>
+    <p:spTree>
+      <p:nvGrpSpPr>
+        <p:cNvPr id="1" name=""/>
+        <p:cNvGrpSpPr/>
+        <p:nvPr/>
+      </p:nvGrpSpPr>
+      <p:grpSpPr>
+        <a:xfrm>
+          <a:off x="0" y="0"/>
+          <a:ext cx="0" cy="0"/>
+          <a:chOff x="0" y="0"/>
+          <a:chExt cx="0" cy="0"/>
+        </a:xfrm>
+      </p:grpSpPr>
+      <p:sp>
+        <p:nvSpPr>
+          <p:cNvPr id="2" name="Slide Image Placeholder 1"/>
+          <p:cNvSpPr>
+            <a:spLocks noGrp="1" noRot="1" noChangeAspect="1"/>
+          </p:cNvSpPr>
+          <p:nvPr>
+            <p:ph type="sldImg"/>
+          </p:nvPr>
+        </p:nvSpPr>
+        <p:spPr/>
+      </p:sp>
+      <p:sp>
+        <p:nvSpPr>
+          <p:cNvPr id="3" name="Notes Placeholder 2"/>
+          <p:cNvSpPr>
+            <a:spLocks noGrp="1"/>
+          </p:cNvSpPr>
+          <p:nvPr>
+            <p:ph type="body" idx="1"/>
+          </p:nvPr>
+        </p:nvSpPr>
+        <p:spPr/>
+        <p:txBody>
+          <a:bodyPr/>
+          <a:lstStyle/>
+          <a:p>
+            <a:r>
+              <a:rPr lang="en-US" sz="1200" b="0" i="0" kern="1200" dirty="0">
+                <a:solidFill>
+                  <a:schemeClr val="tx1"/>
+                </a:solidFill>
+                <a:effectLst/>
+                <a:latin typeface="+mn-lt"/>
+                <a:ea typeface="+mn-ea"/>
+                <a:cs typeface="+mn-cs"/>
+              </a:rPr>
+              <a:t>Beyond the agent and the environment, one can identify four main </a:t>
+            </a:r>
+            <a:r>
+              <a:rPr lang="en-US" sz="1200" b="0" i="0" kern="1200" dirty="0" err="1">
+                <a:solidFill>
+                  <a:schemeClr val="tx1"/>
+                </a:solidFill>
+                <a:effectLst/>
+                <a:latin typeface="+mn-lt"/>
+                <a:ea typeface="+mn-ea"/>
+                <a:cs typeface="+mn-cs"/>
+              </a:rPr>
+              <a:t>subelements</a:t>
+            </a:r>
+            <a:r>
+              <a:rPr lang="en-US" sz="1200" b="0" i="0" kern="1200" dirty="0">
+                <a:solidFill>
+                  <a:schemeClr val="tx1"/>
+                </a:solidFill>
+                <a:effectLst/>
+                <a:latin typeface="+mn-lt"/>
+                <a:ea typeface="+mn-ea"/>
+                <a:cs typeface="+mn-cs"/>
+              </a:rPr>
+              <a:t> of a</a:t>
+            </a:r>
+            <a:br>
+              <a:rPr lang="en-US" sz="1200" b="0" i="0" kern="1200" dirty="0">
+                <a:solidFill>
+                  <a:schemeClr val="tx1"/>
+                </a:solidFill>
+                <a:effectLst/>
+                <a:latin typeface="+mn-lt"/>
+                <a:ea typeface="+mn-ea"/>
+                <a:cs typeface="+mn-cs"/>
+              </a:rPr>
+            </a:br>
+            <a:r>
+              <a:rPr lang="en-US" sz="1200" b="0" i="0" kern="1200" dirty="0">
+                <a:solidFill>
+                  <a:schemeClr val="tx1"/>
+                </a:solidFill>
+                <a:effectLst/>
+                <a:latin typeface="+mn-lt"/>
+                <a:ea typeface="+mn-ea"/>
+                <a:cs typeface="+mn-cs"/>
+              </a:rPr>
+              <a:t>reinforcement learning system: a </a:t>
+            </a:r>
+            <a:r>
+              <a:rPr lang="en-US" sz="1200" b="0" i="1" kern="1200" dirty="0">
+                <a:solidFill>
+                  <a:schemeClr val="tx1"/>
+                </a:solidFill>
+                <a:effectLst/>
+                <a:latin typeface="+mn-lt"/>
+                <a:ea typeface="+mn-ea"/>
+                <a:cs typeface="+mn-cs"/>
+              </a:rPr>
+              <a:t>policy</a:t>
+            </a:r>
+            <a:r>
+              <a:rPr lang="en-US" sz="1200" b="0" i="0" kern="1200" dirty="0">
+                <a:solidFill>
+                  <a:schemeClr val="tx1"/>
+                </a:solidFill>
+                <a:effectLst/>
+                <a:latin typeface="+mn-lt"/>
+                <a:ea typeface="+mn-ea"/>
+                <a:cs typeface="+mn-cs"/>
+              </a:rPr>
+              <a:t>, a </a:t>
+            </a:r>
+            <a:r>
+              <a:rPr lang="en-US" sz="1200" b="0" i="1" kern="1200" dirty="0">
+                <a:solidFill>
+                  <a:schemeClr val="tx1"/>
+                </a:solidFill>
+                <a:effectLst/>
+                <a:latin typeface="+mn-lt"/>
+                <a:ea typeface="+mn-ea"/>
+                <a:cs typeface="+mn-cs"/>
+              </a:rPr>
+              <a:t>reward signal</a:t>
+            </a:r>
+            <a:r>
+              <a:rPr lang="en-US" sz="1200" b="0" i="0" kern="1200" dirty="0">
+                <a:solidFill>
+                  <a:schemeClr val="tx1"/>
+                </a:solidFill>
+                <a:effectLst/>
+                <a:latin typeface="+mn-lt"/>
+                <a:ea typeface="+mn-ea"/>
+                <a:cs typeface="+mn-cs"/>
+              </a:rPr>
+              <a:t>, a </a:t>
+            </a:r>
+            <a:r>
+              <a:rPr lang="en-US" sz="1200" b="0" i="1" kern="1200" dirty="0">
+                <a:solidFill>
+                  <a:schemeClr val="tx1"/>
+                </a:solidFill>
+                <a:effectLst/>
+                <a:latin typeface="+mn-lt"/>
+                <a:ea typeface="+mn-ea"/>
+                <a:cs typeface="+mn-cs"/>
+              </a:rPr>
+              <a:t>value function</a:t>
+            </a:r>
+            <a:r>
+              <a:rPr lang="en-US" sz="1200" b="0" i="0" kern="1200" dirty="0">
+                <a:solidFill>
+                  <a:schemeClr val="tx1"/>
+                </a:solidFill>
+                <a:effectLst/>
+                <a:latin typeface="+mn-lt"/>
+                <a:ea typeface="+mn-ea"/>
+                <a:cs typeface="+mn-cs"/>
+              </a:rPr>
+              <a:t>, and, optionally,</a:t>
+            </a:r>
+            <a:br>
+              <a:rPr lang="en-US" sz="1200" b="0" i="0" kern="1200" dirty="0">
+                <a:solidFill>
+                  <a:schemeClr val="tx1"/>
+                </a:solidFill>
+                <a:effectLst/>
+                <a:latin typeface="+mn-lt"/>
+                <a:ea typeface="+mn-ea"/>
+                <a:cs typeface="+mn-cs"/>
+              </a:rPr>
+            </a:br>
+            <a:r>
+              <a:rPr lang="en-US" sz="1200" b="0" i="0" kern="1200" dirty="0">
+                <a:solidFill>
+                  <a:schemeClr val="tx1"/>
+                </a:solidFill>
+                <a:effectLst/>
+                <a:latin typeface="+mn-lt"/>
+                <a:ea typeface="+mn-ea"/>
+                <a:cs typeface="+mn-cs"/>
+              </a:rPr>
+              <a:t>a </a:t>
+            </a:r>
+            <a:r>
+              <a:rPr lang="en-US" sz="1200" b="0" i="1" kern="1200" dirty="0">
+                <a:solidFill>
+                  <a:schemeClr val="tx1"/>
+                </a:solidFill>
+                <a:effectLst/>
+                <a:latin typeface="+mn-lt"/>
+                <a:ea typeface="+mn-ea"/>
+                <a:cs typeface="+mn-cs"/>
+              </a:rPr>
+              <a:t>model </a:t>
+            </a:r>
+            <a:r>
+              <a:rPr lang="en-US" sz="1200" b="0" i="0" kern="1200" dirty="0">
+                <a:solidFill>
+                  <a:schemeClr val="tx1"/>
+                </a:solidFill>
+                <a:effectLst/>
+                <a:latin typeface="+mn-lt"/>
+                <a:ea typeface="+mn-ea"/>
+                <a:cs typeface="+mn-cs"/>
+              </a:rPr>
+              <a:t>of the environment.</a:t>
+            </a:r>
+          </a:p>
+          <a:p>
+            <a:br>
+              <a:rPr lang="en-US" sz="1200" b="0" i="0" kern="1200" dirty="0">
+                <a:solidFill>
+                  <a:schemeClr val="tx1"/>
+                </a:solidFill>
+                <a:effectLst/>
+                <a:latin typeface="+mn-lt"/>
+                <a:ea typeface="+mn-ea"/>
+                <a:cs typeface="+mn-cs"/>
+              </a:rPr>
+            </a:br>
+            <a:r>
+              <a:rPr lang="en-US" sz="1200" b="0" i="0" kern="1200" dirty="0">
+                <a:solidFill>
+                  <a:schemeClr val="tx1"/>
+                </a:solidFill>
+                <a:effectLst/>
+                <a:latin typeface="+mn-lt"/>
+                <a:ea typeface="+mn-ea"/>
+                <a:cs typeface="+mn-cs"/>
+              </a:rPr>
+              <a:t>1) A </a:t>
+            </a:r>
+            <a:r>
+              <a:rPr lang="en-US" sz="1200" b="0" i="1" kern="1200" dirty="0">
+                <a:solidFill>
+                  <a:schemeClr val="tx1"/>
+                </a:solidFill>
+                <a:effectLst/>
+                <a:latin typeface="+mn-lt"/>
+                <a:ea typeface="+mn-ea"/>
+                <a:cs typeface="+mn-cs"/>
+              </a:rPr>
+              <a:t>policy </a:t>
+            </a:r>
+            <a:r>
+              <a:rPr lang="en-US" sz="1200" b="0" i="0" kern="1200" dirty="0">
+                <a:solidFill>
+                  <a:schemeClr val="tx1"/>
+                </a:solidFill>
+                <a:effectLst/>
+                <a:latin typeface="+mn-lt"/>
+                <a:ea typeface="+mn-ea"/>
+                <a:cs typeface="+mn-cs"/>
+              </a:rPr>
+              <a:t>defines the learning agent’s way of behaving at a given time. Roughly speaking,</a:t>
+            </a:r>
+            <a:br>
+              <a:rPr lang="en-US" sz="1200" b="0" i="0" kern="1200" dirty="0">
+                <a:solidFill>
+                  <a:schemeClr val="tx1"/>
+                </a:solidFill>
+                <a:effectLst/>
+                <a:latin typeface="+mn-lt"/>
+                <a:ea typeface="+mn-ea"/>
+                <a:cs typeface="+mn-cs"/>
+              </a:rPr>
+            </a:br>
+            <a:r>
+              <a:rPr lang="en-US" sz="1200" b="0" i="0" kern="1200" dirty="0">
+                <a:solidFill>
+                  <a:schemeClr val="tx1"/>
+                </a:solidFill>
+                <a:effectLst/>
+                <a:latin typeface="+mn-lt"/>
+                <a:ea typeface="+mn-ea"/>
+                <a:cs typeface="+mn-cs"/>
+              </a:rPr>
+              <a:t>a policy is a mapping from perceived states of the environment to actions to be taken</a:t>
+            </a:r>
+            <a:br>
+              <a:rPr lang="en-US" sz="1200" b="0" i="0" kern="1200" dirty="0">
+                <a:solidFill>
+                  <a:schemeClr val="tx1"/>
+                </a:solidFill>
+                <a:effectLst/>
+                <a:latin typeface="+mn-lt"/>
+                <a:ea typeface="+mn-ea"/>
+                <a:cs typeface="+mn-cs"/>
+              </a:rPr>
+            </a:br>
+            <a:r>
+              <a:rPr lang="en-US" sz="1200" b="0" i="0" kern="1200" dirty="0">
+                <a:solidFill>
+                  <a:schemeClr val="tx1"/>
+                </a:solidFill>
+                <a:effectLst/>
+                <a:latin typeface="+mn-lt"/>
+                <a:ea typeface="+mn-ea"/>
+                <a:cs typeface="+mn-cs"/>
+              </a:rPr>
+              <a:t>when in those states. It corresponds to what in psychology would be called a set of</a:t>
+            </a:r>
+            <a:br>
+              <a:rPr lang="en-US" sz="1200" b="0" i="0" kern="1200" dirty="0">
+                <a:solidFill>
+                  <a:schemeClr val="tx1"/>
+                </a:solidFill>
+                <a:effectLst/>
+                <a:latin typeface="+mn-lt"/>
+                <a:ea typeface="+mn-ea"/>
+                <a:cs typeface="+mn-cs"/>
+              </a:rPr>
+            </a:br>
+            <a:r>
+              <a:rPr lang="en-US" sz="1200" b="0" i="0" kern="1200" dirty="0">
+                <a:solidFill>
+                  <a:schemeClr val="tx1"/>
+                </a:solidFill>
+                <a:effectLst/>
+                <a:latin typeface="+mn-lt"/>
+                <a:ea typeface="+mn-ea"/>
+                <a:cs typeface="+mn-cs"/>
+              </a:rPr>
+              <a:t>stimulus–response rules or associations. In some cases the policy may be a simple function</a:t>
+            </a:r>
+            <a:br>
+              <a:rPr lang="en-US" sz="1200" b="0" i="0" kern="1200" dirty="0">
+                <a:solidFill>
+                  <a:schemeClr val="tx1"/>
+                </a:solidFill>
+                <a:effectLst/>
+                <a:latin typeface="+mn-lt"/>
+                <a:ea typeface="+mn-ea"/>
+                <a:cs typeface="+mn-cs"/>
+              </a:rPr>
+            </a:br>
+            <a:r>
+              <a:rPr lang="en-US" sz="1200" b="0" i="0" kern="1200" dirty="0">
+                <a:solidFill>
+                  <a:schemeClr val="tx1"/>
+                </a:solidFill>
+                <a:effectLst/>
+                <a:latin typeface="+mn-lt"/>
+                <a:ea typeface="+mn-ea"/>
+                <a:cs typeface="+mn-cs"/>
+              </a:rPr>
+              <a:t>or lookup table, whereas in others it may involve extensive computation such as a search</a:t>
+            </a:r>
+            <a:br>
+              <a:rPr lang="en-US" sz="1200" b="0" i="0" kern="1200" dirty="0">
+                <a:solidFill>
+                  <a:schemeClr val="tx1"/>
+                </a:solidFill>
+                <a:effectLst/>
+                <a:latin typeface="+mn-lt"/>
+                <a:ea typeface="+mn-ea"/>
+                <a:cs typeface="+mn-cs"/>
+              </a:rPr>
+            </a:br>
+            <a:r>
+              <a:rPr lang="en-US" sz="1200" b="0" i="0" kern="1200" dirty="0">
+                <a:solidFill>
+                  <a:schemeClr val="tx1"/>
+                </a:solidFill>
+                <a:effectLst/>
+                <a:latin typeface="+mn-lt"/>
+                <a:ea typeface="+mn-ea"/>
+                <a:cs typeface="+mn-cs"/>
+              </a:rPr>
+              <a:t>process. The policy is the core of a reinforcement learning agent in the sense that it alone</a:t>
+            </a:r>
+            <a:br>
+              <a:rPr lang="en-US" sz="1200" b="0" i="0" kern="1200" dirty="0">
+                <a:solidFill>
+                  <a:schemeClr val="tx1"/>
+                </a:solidFill>
+                <a:effectLst/>
+                <a:latin typeface="+mn-lt"/>
+                <a:ea typeface="+mn-ea"/>
+                <a:cs typeface="+mn-cs"/>
+              </a:rPr>
+            </a:br>
+            <a:r>
+              <a:rPr lang="en-US" sz="1200" b="0" i="0" kern="1200" dirty="0">
+                <a:solidFill>
+                  <a:schemeClr val="tx1"/>
+                </a:solidFill>
+                <a:effectLst/>
+                <a:latin typeface="+mn-lt"/>
+                <a:ea typeface="+mn-ea"/>
+                <a:cs typeface="+mn-cs"/>
+              </a:rPr>
+              <a:t>is </a:t>
+            </a:r>
+            <a:r>
+              <a:rPr lang="en-US" sz="1200" b="0" i="0" kern="1200" dirty="0" err="1">
+                <a:solidFill>
+                  <a:schemeClr val="tx1"/>
+                </a:solidFill>
+                <a:effectLst/>
+                <a:latin typeface="+mn-lt"/>
+                <a:ea typeface="+mn-ea"/>
+                <a:cs typeface="+mn-cs"/>
+              </a:rPr>
+              <a:t>su!cient</a:t>
+            </a:r>
+            <a:r>
+              <a:rPr lang="en-US" sz="1200" b="0" i="0" kern="1200" dirty="0">
+                <a:solidFill>
+                  <a:schemeClr val="tx1"/>
+                </a:solidFill>
+                <a:effectLst/>
+                <a:latin typeface="+mn-lt"/>
+                <a:ea typeface="+mn-ea"/>
+                <a:cs typeface="+mn-cs"/>
+              </a:rPr>
+              <a:t> to determine behavior. In general, policies may be stochastic, specifying</a:t>
+            </a:r>
+            <a:br>
+              <a:rPr lang="en-US" sz="1200" b="0" i="0" kern="1200" dirty="0">
+                <a:solidFill>
+                  <a:schemeClr val="tx1"/>
+                </a:solidFill>
+                <a:effectLst/>
+                <a:latin typeface="+mn-lt"/>
+                <a:ea typeface="+mn-ea"/>
+                <a:cs typeface="+mn-cs"/>
+              </a:rPr>
+            </a:br>
+            <a:r>
+              <a:rPr lang="en-US" sz="1200" b="0" i="0" kern="1200" dirty="0">
+                <a:solidFill>
+                  <a:schemeClr val="tx1"/>
+                </a:solidFill>
+                <a:effectLst/>
+                <a:latin typeface="+mn-lt"/>
+                <a:ea typeface="+mn-ea"/>
+                <a:cs typeface="+mn-cs"/>
+              </a:rPr>
+              <a:t>probabilities for each action.</a:t>
+            </a:r>
+            <a:br>
+              <a:rPr lang="en-US" sz="1200" b="0" i="0" kern="1200" dirty="0">
+                <a:solidFill>
+                  <a:schemeClr val="tx1"/>
+                </a:solidFill>
+                <a:effectLst/>
+                <a:latin typeface="+mn-lt"/>
+                <a:ea typeface="+mn-ea"/>
+                <a:cs typeface="+mn-cs"/>
+              </a:rPr>
+            </a:br>
+            <a:r>
+              <a:rPr lang="en-US" sz="1200" b="0" i="0" kern="1200" dirty="0">
+                <a:solidFill>
+                  <a:schemeClr val="tx1"/>
+                </a:solidFill>
+                <a:effectLst/>
+                <a:latin typeface="+mn-lt"/>
+                <a:ea typeface="+mn-ea"/>
+                <a:cs typeface="+mn-cs"/>
+              </a:rPr>
+              <a:t>A </a:t>
+            </a:r>
+            <a:r>
+              <a:rPr lang="en-US" sz="1200" b="0" i="1" kern="1200" dirty="0">
+                <a:solidFill>
+                  <a:schemeClr val="tx1"/>
+                </a:solidFill>
+                <a:effectLst/>
+                <a:latin typeface="+mn-lt"/>
+                <a:ea typeface="+mn-ea"/>
+                <a:cs typeface="+mn-cs"/>
+              </a:rPr>
+              <a:t>reward signal </a:t>
+            </a:r>
+            <a:r>
+              <a:rPr lang="en-US" sz="1200" b="0" i="0" kern="1200" dirty="0">
+                <a:solidFill>
+                  <a:schemeClr val="tx1"/>
+                </a:solidFill>
+                <a:effectLst/>
+                <a:latin typeface="+mn-lt"/>
+                <a:ea typeface="+mn-ea"/>
+                <a:cs typeface="+mn-cs"/>
+              </a:rPr>
+              <a:t>defines the goal of a reinforcement learning problem. On each time</a:t>
+            </a:r>
+            <a:br>
+              <a:rPr lang="en-US" sz="1200" b="0" i="0" kern="1200" dirty="0">
+                <a:solidFill>
+                  <a:schemeClr val="tx1"/>
+                </a:solidFill>
+                <a:effectLst/>
+                <a:latin typeface="+mn-lt"/>
+                <a:ea typeface="+mn-ea"/>
+                <a:cs typeface="+mn-cs"/>
+              </a:rPr>
+            </a:br>
+            <a:r>
+              <a:rPr lang="en-US" sz="1200" b="0" i="0" kern="1200" dirty="0">
+                <a:solidFill>
+                  <a:schemeClr val="tx1"/>
+                </a:solidFill>
+                <a:effectLst/>
+                <a:latin typeface="+mn-lt"/>
+                <a:ea typeface="+mn-ea"/>
+                <a:cs typeface="+mn-cs"/>
+              </a:rPr>
+              <a:t>step, the environment sends to the reinforcement learning agent a single number called</a:t>
+            </a:r>
+            <a:br>
+              <a:rPr lang="en-US" sz="1200" b="0" i="0" kern="1200" dirty="0">
+                <a:solidFill>
+                  <a:schemeClr val="tx1"/>
+                </a:solidFill>
+                <a:effectLst/>
+                <a:latin typeface="+mn-lt"/>
+                <a:ea typeface="+mn-ea"/>
+                <a:cs typeface="+mn-cs"/>
+              </a:rPr>
+            </a:br>
+            <a:r>
+              <a:rPr lang="en-US" sz="1200" b="0" i="0" kern="1200" dirty="0">
+                <a:solidFill>
+                  <a:schemeClr val="tx1"/>
+                </a:solidFill>
+                <a:effectLst/>
+                <a:latin typeface="+mn-lt"/>
+                <a:ea typeface="+mn-ea"/>
+                <a:cs typeface="+mn-cs"/>
+              </a:rPr>
+              <a:t>the </a:t>
+            </a:r>
+            <a:r>
+              <a:rPr lang="en-US" sz="1200" b="0" i="1" kern="1200" dirty="0">
+                <a:solidFill>
+                  <a:schemeClr val="tx1"/>
+                </a:solidFill>
+                <a:effectLst/>
+                <a:latin typeface="+mn-lt"/>
+                <a:ea typeface="+mn-ea"/>
+                <a:cs typeface="+mn-cs"/>
+              </a:rPr>
+              <a:t>reward</a:t>
+            </a:r>
+            <a:r>
+              <a:rPr lang="en-US" sz="1200" b="0" i="0" kern="1200" dirty="0">
+                <a:solidFill>
+                  <a:schemeClr val="tx1"/>
+                </a:solidFill>
+                <a:effectLst/>
+                <a:latin typeface="+mn-lt"/>
+                <a:ea typeface="+mn-ea"/>
+                <a:cs typeface="+mn-cs"/>
+              </a:rPr>
+              <a:t>. The agent’s sole objective is to maximize the total reward it receives over</a:t>
+            </a:r>
+            <a:br>
+              <a:rPr lang="en-US" sz="1200" b="0" i="0" kern="1200" dirty="0">
+                <a:solidFill>
+                  <a:schemeClr val="tx1"/>
+                </a:solidFill>
+                <a:effectLst/>
+                <a:latin typeface="+mn-lt"/>
+                <a:ea typeface="+mn-ea"/>
+                <a:cs typeface="+mn-cs"/>
+              </a:rPr>
+            </a:br>
+            <a:r>
+              <a:rPr lang="en-US" sz="1200" b="0" i="0" kern="1200" dirty="0">
+                <a:solidFill>
+                  <a:schemeClr val="tx1"/>
+                </a:solidFill>
+                <a:effectLst/>
+                <a:latin typeface="+mn-lt"/>
+                <a:ea typeface="+mn-ea"/>
+                <a:cs typeface="+mn-cs"/>
+              </a:rPr>
+              <a:t>the long run. The reward signal thus defines what are the good and bad events for the</a:t>
+            </a:r>
+            <a:br>
+              <a:rPr lang="en-US" sz="1200" b="0" i="0" kern="1200" dirty="0">
+                <a:solidFill>
+                  <a:schemeClr val="tx1"/>
+                </a:solidFill>
+                <a:effectLst/>
+                <a:latin typeface="+mn-lt"/>
+                <a:ea typeface="+mn-ea"/>
+                <a:cs typeface="+mn-cs"/>
+              </a:rPr>
+            </a:br>
+            <a:r>
+              <a:rPr lang="en-US" sz="1200" b="0" i="0" kern="1200" dirty="0">
+                <a:solidFill>
+                  <a:schemeClr val="tx1"/>
+                </a:solidFill>
+                <a:effectLst/>
+                <a:latin typeface="+mn-lt"/>
+                <a:ea typeface="+mn-ea"/>
+                <a:cs typeface="+mn-cs"/>
+              </a:rPr>
+              <a:t>agent. In a biological system, we might think of rewards as analogous to the experiences</a:t>
+            </a:r>
+            <a:br>
+              <a:rPr lang="en-US" sz="1200" b="0" i="0" kern="1200" dirty="0">
+                <a:solidFill>
+                  <a:schemeClr val="tx1"/>
+                </a:solidFill>
+                <a:effectLst/>
+                <a:latin typeface="+mn-lt"/>
+                <a:ea typeface="+mn-ea"/>
+                <a:cs typeface="+mn-cs"/>
+              </a:rPr>
+            </a:br>
+            <a:r>
+              <a:rPr lang="en-US" sz="1200" b="0" i="0" kern="1200" dirty="0">
+                <a:solidFill>
+                  <a:schemeClr val="tx1"/>
+                </a:solidFill>
+                <a:effectLst/>
+                <a:latin typeface="+mn-lt"/>
+                <a:ea typeface="+mn-ea"/>
+                <a:cs typeface="+mn-cs"/>
+              </a:rPr>
+              <a:t>of pleasure or pain. They are the immediate and defining features of the problem faced</a:t>
+            </a:r>
+            <a:br>
+              <a:rPr lang="en-US" sz="1200" b="0" i="0" kern="1200" dirty="0">
+                <a:solidFill>
+                  <a:schemeClr val="tx1"/>
+                </a:solidFill>
+                <a:effectLst/>
+                <a:latin typeface="+mn-lt"/>
+                <a:ea typeface="+mn-ea"/>
+                <a:cs typeface="+mn-cs"/>
+              </a:rPr>
+            </a:br>
+            <a:r>
+              <a:rPr lang="en-US" sz="1200" b="0" i="0" kern="1200" dirty="0">
+                <a:solidFill>
+                  <a:schemeClr val="tx1"/>
+                </a:solidFill>
+                <a:effectLst/>
+                <a:latin typeface="+mn-lt"/>
+                <a:ea typeface="+mn-ea"/>
+                <a:cs typeface="+mn-cs"/>
+              </a:rPr>
+              <a:t>by the agent. The reward signal is the primary basis for altering the policy; if an action</a:t>
+            </a:r>
+            <a:br>
+              <a:rPr lang="en-US" sz="1200" b="0" i="0" kern="1200" dirty="0">
+                <a:solidFill>
+                  <a:schemeClr val="tx1"/>
+                </a:solidFill>
+                <a:effectLst/>
+                <a:latin typeface="+mn-lt"/>
+                <a:ea typeface="+mn-ea"/>
+                <a:cs typeface="+mn-cs"/>
+              </a:rPr>
+            </a:br>
+            <a:r>
+              <a:rPr lang="en-US" sz="1200" b="0" i="0" kern="1200" dirty="0">
+                <a:solidFill>
+                  <a:schemeClr val="tx1"/>
+                </a:solidFill>
+                <a:effectLst/>
+                <a:latin typeface="+mn-lt"/>
+                <a:ea typeface="+mn-ea"/>
+                <a:cs typeface="+mn-cs"/>
+              </a:rPr>
+              <a:t>selected by the policy is followed by low reward, then the policy may be changed to</a:t>
+            </a:r>
+            <a:br>
+              <a:rPr lang="en-US" sz="1200" b="0" i="0" kern="1200" dirty="0">
+                <a:solidFill>
+                  <a:schemeClr val="tx1"/>
+                </a:solidFill>
+                <a:effectLst/>
+                <a:latin typeface="+mn-lt"/>
+                <a:ea typeface="+mn-ea"/>
+                <a:cs typeface="+mn-cs"/>
+              </a:rPr>
+            </a:br>
+            <a:r>
+              <a:rPr lang="en-US" sz="1200" b="0" i="0" kern="1200" dirty="0">
+                <a:solidFill>
+                  <a:schemeClr val="tx1"/>
+                </a:solidFill>
+                <a:effectLst/>
+                <a:latin typeface="+mn-lt"/>
+                <a:ea typeface="+mn-ea"/>
+                <a:cs typeface="+mn-cs"/>
+              </a:rPr>
+              <a:t>select some other action in that situation in the future. In general, reward signals may</a:t>
+            </a:r>
+            <a:br>
+              <a:rPr lang="en-US" sz="1200" b="0" i="0" kern="1200" dirty="0">
+                <a:solidFill>
+                  <a:schemeClr val="tx1"/>
+                </a:solidFill>
+                <a:effectLst/>
+                <a:latin typeface="+mn-lt"/>
+                <a:ea typeface="+mn-ea"/>
+                <a:cs typeface="+mn-cs"/>
+              </a:rPr>
+            </a:br>
+            <a:r>
+              <a:rPr lang="en-US" sz="1200" b="0" i="0" kern="1200" dirty="0">
+                <a:solidFill>
+                  <a:schemeClr val="tx1"/>
+                </a:solidFill>
+                <a:effectLst/>
+                <a:latin typeface="+mn-lt"/>
+                <a:ea typeface="+mn-ea"/>
+                <a:cs typeface="+mn-cs"/>
+              </a:rPr>
+              <a:t>be stochastic functions of the state of the environment and the actions taken.</a:t>
+            </a:r>
+            <a:br>
+              <a:rPr lang="en-US" sz="1200" b="0" i="0" kern="1200" dirty="0">
+                <a:solidFill>
+                  <a:schemeClr val="tx1"/>
+                </a:solidFill>
+                <a:effectLst/>
+                <a:latin typeface="+mn-lt"/>
+                <a:ea typeface="+mn-ea"/>
+                <a:cs typeface="+mn-cs"/>
+              </a:rPr>
+            </a:br>
+            <a:r>
+              <a:rPr lang="en-US" sz="1200" b="0" i="0" kern="1200" dirty="0">
+                <a:solidFill>
+                  <a:schemeClr val="tx1"/>
+                </a:solidFill>
+                <a:effectLst/>
+                <a:latin typeface="+mn-lt"/>
+                <a:ea typeface="+mn-ea"/>
+                <a:cs typeface="+mn-cs"/>
+              </a:rPr>
+              <a:t>Whereas the reward signal indicates what is good in an immediate sense, a </a:t>
+            </a:r>
+            <a:r>
+              <a:rPr lang="en-US" sz="1200" b="0" i="1" kern="1200" dirty="0">
+                <a:solidFill>
+                  <a:schemeClr val="tx1"/>
+                </a:solidFill>
+                <a:effectLst/>
+                <a:latin typeface="+mn-lt"/>
+                <a:ea typeface="+mn-ea"/>
+                <a:cs typeface="+mn-cs"/>
+              </a:rPr>
+              <a:t>value</a:t>
+            </a:r>
+            <a:br>
+              <a:rPr lang="en-US" sz="1200" b="0" i="1" kern="1200" dirty="0">
+                <a:solidFill>
+                  <a:schemeClr val="tx1"/>
+                </a:solidFill>
+                <a:effectLst/>
+                <a:latin typeface="+mn-lt"/>
+                <a:ea typeface="+mn-ea"/>
+                <a:cs typeface="+mn-cs"/>
+              </a:rPr>
+            </a:br>
+            <a:r>
+              <a:rPr lang="en-US" sz="1200" b="0" i="1" kern="1200" dirty="0">
+                <a:solidFill>
+                  <a:schemeClr val="tx1"/>
+                </a:solidFill>
+                <a:effectLst/>
+                <a:latin typeface="+mn-lt"/>
+                <a:ea typeface="+mn-ea"/>
+                <a:cs typeface="+mn-cs"/>
+              </a:rPr>
+              <a:t>function </a:t>
+            </a:r>
+            <a:r>
+              <a:rPr lang="en-US" sz="1200" b="0" i="0" kern="1200" dirty="0">
+                <a:solidFill>
+                  <a:schemeClr val="tx1"/>
+                </a:solidFill>
+                <a:effectLst/>
+                <a:latin typeface="+mn-lt"/>
+                <a:ea typeface="+mn-ea"/>
+                <a:cs typeface="+mn-cs"/>
+              </a:rPr>
+              <a:t>specifies what is good in the long run. Roughly speaking, the </a:t>
+            </a:r>
+            <a:r>
+              <a:rPr lang="en-US" sz="1200" b="0" i="1" kern="1200" dirty="0">
+                <a:solidFill>
+                  <a:schemeClr val="tx1"/>
+                </a:solidFill>
+                <a:effectLst/>
+                <a:latin typeface="+mn-lt"/>
+                <a:ea typeface="+mn-ea"/>
+                <a:cs typeface="+mn-cs"/>
+              </a:rPr>
+              <a:t>value </a:t>
+            </a:r>
+            <a:r>
+              <a:rPr lang="en-US" sz="1200" b="0" i="0" kern="1200" dirty="0">
+                <a:solidFill>
+                  <a:schemeClr val="tx1"/>
+                </a:solidFill>
+                <a:effectLst/>
+                <a:latin typeface="+mn-lt"/>
+                <a:ea typeface="+mn-ea"/>
+                <a:cs typeface="+mn-cs"/>
+              </a:rPr>
+              <a:t>of a state is</a:t>
+            </a:r>
+            <a:br>
+              <a:rPr lang="en-US" sz="1200" b="0" i="0" kern="1200" dirty="0">
+                <a:solidFill>
+                  <a:schemeClr val="tx1"/>
+                </a:solidFill>
+                <a:effectLst/>
+                <a:latin typeface="+mn-lt"/>
+                <a:ea typeface="+mn-ea"/>
+                <a:cs typeface="+mn-cs"/>
+              </a:rPr>
+            </a:br>
+            <a:r>
+              <a:rPr lang="en-US" sz="1200" b="0" i="0" kern="1200" dirty="0">
+                <a:solidFill>
+                  <a:schemeClr val="tx1"/>
+                </a:solidFill>
+                <a:effectLst/>
+                <a:latin typeface="+mn-lt"/>
+                <a:ea typeface="+mn-ea"/>
+                <a:cs typeface="+mn-cs"/>
+              </a:rPr>
+              <a:t>the total amount of reward an agent can expect to accumulate over the future, starting</a:t>
+            </a:r>
+            <a:br>
+              <a:rPr lang="en-US" sz="1200" b="0" i="0" kern="1200" dirty="0">
+                <a:solidFill>
+                  <a:schemeClr val="tx1"/>
+                </a:solidFill>
+                <a:effectLst/>
+                <a:latin typeface="+mn-lt"/>
+                <a:ea typeface="+mn-ea"/>
+                <a:cs typeface="+mn-cs"/>
+              </a:rPr>
+            </a:br>
+            <a:r>
+              <a:rPr lang="en-US" sz="1200" b="0" i="0" kern="1200" dirty="0">
+                <a:solidFill>
+                  <a:schemeClr val="tx1"/>
+                </a:solidFill>
+                <a:effectLst/>
+                <a:latin typeface="+mn-lt"/>
+                <a:ea typeface="+mn-ea"/>
+                <a:cs typeface="+mn-cs"/>
+              </a:rPr>
+              <a:t>from that state. Whereas rewards determine the immediate, intrinsic desirability of</a:t>
+            </a:r>
+            <a:br>
+              <a:rPr lang="en-US" sz="1200" b="0" i="0" kern="1200" dirty="0">
+                <a:solidFill>
+                  <a:schemeClr val="tx1"/>
+                </a:solidFill>
+                <a:effectLst/>
+                <a:latin typeface="+mn-lt"/>
+                <a:ea typeface="+mn-ea"/>
+                <a:cs typeface="+mn-cs"/>
+              </a:rPr>
+            </a:br>
+            <a:r>
+              <a:rPr lang="en-US" sz="1200" b="0" i="0" kern="1200" dirty="0">
+                <a:solidFill>
+                  <a:schemeClr val="tx1"/>
+                </a:solidFill>
+                <a:effectLst/>
+                <a:latin typeface="+mn-lt"/>
+                <a:ea typeface="+mn-ea"/>
+                <a:cs typeface="+mn-cs"/>
+              </a:rPr>
+              <a:t>environmental states, values indicate the </a:t>
+            </a:r>
+            <a:r>
+              <a:rPr lang="en-US" sz="1200" b="0" i="1" kern="1200" dirty="0">
+                <a:solidFill>
+                  <a:schemeClr val="tx1"/>
+                </a:solidFill>
+                <a:effectLst/>
+                <a:latin typeface="+mn-lt"/>
+                <a:ea typeface="+mn-ea"/>
+                <a:cs typeface="+mn-cs"/>
+              </a:rPr>
+              <a:t>long-term </a:t>
+            </a:r>
+            <a:r>
+              <a:rPr lang="en-US" sz="1200" b="0" i="0" kern="1200" dirty="0">
+                <a:solidFill>
+                  <a:schemeClr val="tx1"/>
+                </a:solidFill>
+                <a:effectLst/>
+                <a:latin typeface="+mn-lt"/>
+                <a:ea typeface="+mn-ea"/>
+                <a:cs typeface="+mn-cs"/>
+              </a:rPr>
+              <a:t>desirability of states after taking into</a:t>
+            </a:r>
+            <a:br>
+              <a:rPr lang="en-US" sz="1200" b="0" i="0" kern="1200" dirty="0">
+                <a:solidFill>
+                  <a:schemeClr val="tx1"/>
+                </a:solidFill>
+                <a:effectLst/>
+                <a:latin typeface="+mn-lt"/>
+                <a:ea typeface="+mn-ea"/>
+                <a:cs typeface="+mn-cs"/>
+              </a:rPr>
+            </a:br>
+            <a:r>
+              <a:rPr lang="en-US" sz="1200" b="0" i="0" kern="1200" dirty="0">
+                <a:solidFill>
+                  <a:schemeClr val="tx1"/>
+                </a:solidFill>
+                <a:effectLst/>
+                <a:latin typeface="+mn-lt"/>
+                <a:ea typeface="+mn-ea"/>
+                <a:cs typeface="+mn-cs"/>
+              </a:rPr>
+              <a:t>account the states that are likely to follow and the rewards available in those states. For</a:t>
+            </a:r>
+            <a:br>
+              <a:rPr lang="en-US" sz="1200" b="0" i="0" kern="1200" dirty="0">
+                <a:solidFill>
+                  <a:schemeClr val="tx1"/>
+                </a:solidFill>
+                <a:effectLst/>
+                <a:latin typeface="+mn-lt"/>
+                <a:ea typeface="+mn-ea"/>
+                <a:cs typeface="+mn-cs"/>
+              </a:rPr>
+            </a:br>
+            <a:r>
+              <a:rPr lang="en-US" sz="1200" b="0" i="0" kern="1200" dirty="0">
+                <a:solidFill>
+                  <a:schemeClr val="tx1"/>
+                </a:solidFill>
+                <a:effectLst/>
+                <a:latin typeface="+mn-lt"/>
+                <a:ea typeface="+mn-ea"/>
+                <a:cs typeface="+mn-cs"/>
+              </a:rPr>
+              <a:t>example, a state might always yield a low immediate reward but still have a high value</a:t>
+            </a:r>
+            <a:br>
+              <a:rPr lang="en-US" sz="1200" b="0" i="0" kern="1200" dirty="0">
+                <a:solidFill>
+                  <a:schemeClr val="tx1"/>
+                </a:solidFill>
+                <a:effectLst/>
+                <a:latin typeface="+mn-lt"/>
+                <a:ea typeface="+mn-ea"/>
+                <a:cs typeface="+mn-cs"/>
+              </a:rPr>
+            </a:br>
+            <a:r>
+              <a:rPr lang="en-US" sz="1200" b="0" i="0" kern="1200" dirty="0">
+                <a:solidFill>
+                  <a:schemeClr val="tx1"/>
+                </a:solidFill>
+                <a:effectLst/>
+                <a:latin typeface="+mn-lt"/>
+                <a:ea typeface="+mn-ea"/>
+                <a:cs typeface="+mn-cs"/>
+              </a:rPr>
+              <a:t>because it is regularly followed by other states that yield high rewards. Or the reverse</a:t>
+            </a:r>
+            <a:br>
+              <a:rPr lang="en-US" sz="1200" b="0" i="0" kern="1200" dirty="0">
+                <a:solidFill>
+                  <a:schemeClr val="tx1"/>
+                </a:solidFill>
+                <a:effectLst/>
+                <a:latin typeface="+mn-lt"/>
+                <a:ea typeface="+mn-ea"/>
+                <a:cs typeface="+mn-cs"/>
+              </a:rPr>
+            </a:br>
+            <a:r>
+              <a:rPr lang="en-US" sz="1200" b="0" i="0" kern="1200" dirty="0">
+                <a:solidFill>
+                  <a:schemeClr val="tx1"/>
+                </a:solidFill>
+                <a:effectLst/>
+                <a:latin typeface="+mn-lt"/>
+                <a:ea typeface="+mn-ea"/>
+                <a:cs typeface="+mn-cs"/>
+              </a:rPr>
+              <a:t>could be true. To make a human analogy, rewards are somewhat like pleasure (if high)</a:t>
+            </a:r>
+            <a:br>
+              <a:rPr lang="en-US" sz="1200" b="0" i="0" kern="1200" dirty="0">
+                <a:solidFill>
+                  <a:schemeClr val="tx1"/>
+                </a:solidFill>
+                <a:effectLst/>
+                <a:latin typeface="+mn-lt"/>
+                <a:ea typeface="+mn-ea"/>
+                <a:cs typeface="+mn-cs"/>
+              </a:rPr>
+            </a:br>
+            <a:r>
+              <a:rPr lang="en-US" sz="1200" b="0" i="0" kern="1200" dirty="0">
+                <a:solidFill>
+                  <a:schemeClr val="tx1"/>
+                </a:solidFill>
+                <a:effectLst/>
+                <a:latin typeface="+mn-lt"/>
+                <a:ea typeface="+mn-ea"/>
+                <a:cs typeface="+mn-cs"/>
+              </a:rPr>
+              <a:t>and pain (if low), whereas values correspond to a more refined and farsighted judgment</a:t>
+            </a:r>
+            <a:br>
+              <a:rPr lang="en-US" sz="1200" b="0" i="0" kern="1200" dirty="0">
+                <a:solidFill>
+                  <a:schemeClr val="tx1"/>
+                </a:solidFill>
+                <a:effectLst/>
+                <a:latin typeface="+mn-lt"/>
+                <a:ea typeface="+mn-ea"/>
+                <a:cs typeface="+mn-cs"/>
+              </a:rPr>
+            </a:br>
+            <a:r>
+              <a:rPr lang="en-US" sz="1200" b="0" i="0" kern="1200" dirty="0">
+                <a:solidFill>
+                  <a:schemeClr val="tx1"/>
+                </a:solidFill>
+                <a:effectLst/>
+                <a:latin typeface="+mn-lt"/>
+                <a:ea typeface="+mn-ea"/>
+                <a:cs typeface="+mn-cs"/>
+              </a:rPr>
+              <a:t>of how pleased or displeased we are that our environment is in a particular state.</a:t>
+            </a:r>
+            <a:br>
+              <a:rPr lang="en-US" sz="1200" b="0" i="0" kern="1200" dirty="0">
+                <a:solidFill>
+                  <a:schemeClr val="tx1"/>
+                </a:solidFill>
+                <a:effectLst/>
+                <a:latin typeface="+mn-lt"/>
+                <a:ea typeface="+mn-ea"/>
+                <a:cs typeface="+mn-cs"/>
+              </a:rPr>
+            </a:br>
+            <a:r>
+              <a:rPr lang="en-US" sz="1200" b="0" i="0" kern="1200" dirty="0">
+                <a:solidFill>
+                  <a:schemeClr val="tx1"/>
+                </a:solidFill>
+                <a:effectLst/>
+                <a:latin typeface="+mn-lt"/>
+                <a:ea typeface="+mn-ea"/>
+                <a:cs typeface="+mn-cs"/>
+              </a:rPr>
+              <a:t>Rewards are in a sense primary, whereas values, as predictions of rewards, are secondary.</a:t>
+            </a:r>
+            <a:br>
+              <a:rPr lang="en-US" sz="1200" b="0" i="0" kern="1200" dirty="0">
+                <a:solidFill>
+                  <a:schemeClr val="tx1"/>
+                </a:solidFill>
+                <a:effectLst/>
+                <a:latin typeface="+mn-lt"/>
+                <a:ea typeface="+mn-ea"/>
+                <a:cs typeface="+mn-cs"/>
+              </a:rPr>
+            </a:br>
+            <a:r>
+              <a:rPr lang="en-US" sz="1200" b="0" i="0" kern="1200" dirty="0">
+                <a:solidFill>
+                  <a:schemeClr val="tx1"/>
+                </a:solidFill>
+                <a:effectLst/>
+                <a:latin typeface="+mn-lt"/>
+                <a:ea typeface="+mn-ea"/>
+                <a:cs typeface="+mn-cs"/>
+              </a:rPr>
+              <a:t>Without rewards there could be no values, and the only purpose of estimating values is to</a:t>
+            </a:r>
+            <a:br>
+              <a:rPr lang="en-US" sz="1200" b="0" i="0" kern="1200" dirty="0">
+                <a:solidFill>
+                  <a:schemeClr val="tx1"/>
+                </a:solidFill>
+                <a:effectLst/>
+                <a:latin typeface="+mn-lt"/>
+                <a:ea typeface="+mn-ea"/>
+                <a:cs typeface="+mn-cs"/>
+              </a:rPr>
+            </a:br>
+            <a:r>
+              <a:rPr lang="en-US" sz="1200" b="0" i="0" kern="1200" dirty="0">
+                <a:solidFill>
+                  <a:schemeClr val="tx1"/>
+                </a:solidFill>
+                <a:effectLst/>
+                <a:latin typeface="+mn-lt"/>
+                <a:ea typeface="+mn-ea"/>
+                <a:cs typeface="+mn-cs"/>
+              </a:rPr>
+              <a:t>achieve more reward. Nevertheless, it is values with which we are most concerned when</a:t>
+            </a:r>
+            <a:br>
+              <a:rPr lang="en-US" sz="1200" b="0" i="0" kern="1200" dirty="0">
+                <a:solidFill>
+                  <a:schemeClr val="tx1"/>
+                </a:solidFill>
+                <a:effectLst/>
+                <a:latin typeface="+mn-lt"/>
+                <a:ea typeface="+mn-ea"/>
+                <a:cs typeface="+mn-cs"/>
+              </a:rPr>
+            </a:br>
+            <a:r>
+              <a:rPr lang="en-US" sz="1200" b="0" i="0" kern="1200" dirty="0">
+                <a:solidFill>
+                  <a:schemeClr val="tx1"/>
+                </a:solidFill>
+                <a:effectLst/>
+                <a:latin typeface="+mn-lt"/>
+                <a:ea typeface="+mn-ea"/>
+                <a:cs typeface="+mn-cs"/>
+              </a:rPr>
+              <a:t>making and evaluating decisions. Action choices are made based on value judgments. We</a:t>
+            </a:r>
+            <a:br>
+              <a:rPr lang="en-US" sz="1200" b="0" i="0" kern="1200" dirty="0">
+                <a:solidFill>
+                  <a:schemeClr val="tx1"/>
+                </a:solidFill>
+                <a:effectLst/>
+                <a:latin typeface="+mn-lt"/>
+                <a:ea typeface="+mn-ea"/>
+                <a:cs typeface="+mn-cs"/>
+              </a:rPr>
+            </a:br>
+            <a:r>
+              <a:rPr lang="en-US" sz="1200" b="0" i="0" kern="1200" dirty="0">
+                <a:solidFill>
+                  <a:schemeClr val="tx1"/>
+                </a:solidFill>
+                <a:effectLst/>
+                <a:latin typeface="+mn-lt"/>
+                <a:ea typeface="+mn-ea"/>
+                <a:cs typeface="+mn-cs"/>
+              </a:rPr>
+              <a:t>seek actions that bring about states of highest value, not highest reward, because these</a:t>
+            </a:r>
+            <a:br>
+              <a:rPr lang="en-US" sz="1200" b="0" i="0" kern="1200" dirty="0">
+                <a:solidFill>
+                  <a:schemeClr val="tx1"/>
+                </a:solidFill>
+                <a:effectLst/>
+                <a:latin typeface="+mn-lt"/>
+                <a:ea typeface="+mn-ea"/>
+                <a:cs typeface="+mn-cs"/>
+              </a:rPr>
+            </a:br>
+            <a:r>
+              <a:rPr lang="en-US" sz="1200" b="0" i="0" kern="1200" dirty="0">
+                <a:solidFill>
+                  <a:schemeClr val="tx1"/>
+                </a:solidFill>
+                <a:effectLst/>
+                <a:latin typeface="+mn-lt"/>
+                <a:ea typeface="+mn-ea"/>
+                <a:cs typeface="+mn-cs"/>
+              </a:rPr>
+              <a:t>actions obtain the greatest amount of reward for us over the long run. Unfortunately, it</a:t>
+            </a:r>
+            <a:br>
+              <a:rPr lang="en-US" sz="1200" b="0" i="0" kern="1200" dirty="0">
+                <a:solidFill>
+                  <a:schemeClr val="tx1"/>
+                </a:solidFill>
+                <a:effectLst/>
+                <a:latin typeface="+mn-lt"/>
+                <a:ea typeface="+mn-ea"/>
+                <a:cs typeface="+mn-cs"/>
+              </a:rPr>
+            </a:br>
+            <a:r>
+              <a:rPr lang="en-US" sz="1200" b="0" i="0" kern="1200" dirty="0">
+                <a:solidFill>
+                  <a:schemeClr val="tx1"/>
+                </a:solidFill>
+                <a:effectLst/>
+                <a:latin typeface="+mn-lt"/>
+                <a:ea typeface="+mn-ea"/>
+                <a:cs typeface="+mn-cs"/>
+              </a:rPr>
+              <a:t>is much harder to determine values than it is to determine rewards. Rewards are basically</a:t>
+            </a:r>
+            <a:br>
+              <a:rPr lang="en-US" sz="1200" b="0" i="0" kern="1200" dirty="0">
+                <a:solidFill>
+                  <a:schemeClr val="tx1"/>
+                </a:solidFill>
+                <a:effectLst/>
+                <a:latin typeface="+mn-lt"/>
+                <a:ea typeface="+mn-ea"/>
+                <a:cs typeface="+mn-cs"/>
+              </a:rPr>
+            </a:br>
+            <a:r>
+              <a:rPr lang="en-US" sz="1200" b="0" i="0" kern="1200" dirty="0">
+                <a:solidFill>
+                  <a:schemeClr val="tx1"/>
+                </a:solidFill>
+                <a:effectLst/>
+                <a:latin typeface="+mn-lt"/>
+                <a:ea typeface="+mn-ea"/>
+                <a:cs typeface="+mn-cs"/>
+              </a:rPr>
+              <a:t>given directly by the environment, but values must be estimated and re-estimated from</a:t>
+            </a:r>
+            <a:br>
+              <a:rPr lang="en-US" sz="1200" b="0" i="0" kern="1200" dirty="0">
+                <a:solidFill>
+                  <a:schemeClr val="tx1"/>
+                </a:solidFill>
+                <a:effectLst/>
+                <a:latin typeface="+mn-lt"/>
+                <a:ea typeface="+mn-ea"/>
+                <a:cs typeface="+mn-cs"/>
+              </a:rPr>
+            </a:br>
+            <a:r>
+              <a:rPr lang="en-US" sz="1200" b="0" i="0" kern="1200" dirty="0">
+                <a:solidFill>
+                  <a:schemeClr val="tx1"/>
+                </a:solidFill>
+                <a:effectLst/>
+                <a:latin typeface="+mn-lt"/>
+                <a:ea typeface="+mn-ea"/>
+                <a:cs typeface="+mn-cs"/>
+              </a:rPr>
+              <a:t>the sequences of observations an agent makes over its entire lifetime. In fact, the most</a:t>
+            </a:r>
+            <a:br>
+              <a:rPr lang="en-US" sz="1200" b="0" i="0" kern="1200" dirty="0">
+                <a:solidFill>
+                  <a:schemeClr val="tx1"/>
+                </a:solidFill>
+                <a:effectLst/>
+                <a:latin typeface="+mn-lt"/>
+                <a:ea typeface="+mn-ea"/>
+                <a:cs typeface="+mn-cs"/>
+              </a:rPr>
+            </a:br>
+            <a:r>
+              <a:rPr lang="en-US" sz="1200" b="0" i="0" kern="1200" dirty="0">
+                <a:solidFill>
+                  <a:schemeClr val="tx1"/>
+                </a:solidFill>
+                <a:effectLst/>
+                <a:latin typeface="+mn-lt"/>
+                <a:ea typeface="+mn-ea"/>
+                <a:cs typeface="+mn-cs"/>
+              </a:rPr>
+              <a:t>important component of almost all reinforcement learning algorithms we consider is a</a:t>
+            </a:r>
+            <a:br>
+              <a:rPr lang="en-US" dirty="0"/>
+            </a:br>
+            <a:r>
+              <a:rPr lang="en-US" sz="1200" b="0" i="0" kern="1200" dirty="0">
+                <a:solidFill>
+                  <a:schemeClr val="tx1"/>
+                </a:solidFill>
+                <a:effectLst/>
+                <a:latin typeface="+mn-lt"/>
+                <a:ea typeface="+mn-ea"/>
+                <a:cs typeface="+mn-cs"/>
+              </a:rPr>
+              <a:t>method for </a:t>
+            </a:r>
+            <a:r>
+              <a:rPr lang="en-US" sz="1200" b="0" i="0" kern="1200" dirty="0" err="1">
+                <a:solidFill>
+                  <a:schemeClr val="tx1"/>
+                </a:solidFill>
+                <a:effectLst/>
+                <a:latin typeface="+mn-lt"/>
+                <a:ea typeface="+mn-ea"/>
+                <a:cs typeface="+mn-cs"/>
+              </a:rPr>
+              <a:t>e!ciently</a:t>
+            </a:r>
+            <a:r>
+              <a:rPr lang="en-US" sz="1200" b="0" i="0" kern="1200" dirty="0">
+                <a:solidFill>
+                  <a:schemeClr val="tx1"/>
+                </a:solidFill>
+                <a:effectLst/>
+                <a:latin typeface="+mn-lt"/>
+                <a:ea typeface="+mn-ea"/>
+                <a:cs typeface="+mn-cs"/>
+              </a:rPr>
+              <a:t> estimating values. The central role of value estimation is arguably</a:t>
+            </a:r>
+            <a:br>
+              <a:rPr lang="en-US" sz="1200" b="0" i="0" kern="1200" dirty="0">
+                <a:solidFill>
+                  <a:schemeClr val="tx1"/>
+                </a:solidFill>
+                <a:effectLst/>
+                <a:latin typeface="+mn-lt"/>
+                <a:ea typeface="+mn-ea"/>
+                <a:cs typeface="+mn-cs"/>
+              </a:rPr>
+            </a:br>
+            <a:r>
+              <a:rPr lang="en-US" sz="1200" b="0" i="0" kern="1200" dirty="0">
+                <a:solidFill>
+                  <a:schemeClr val="tx1"/>
+                </a:solidFill>
+                <a:effectLst/>
+                <a:latin typeface="+mn-lt"/>
+                <a:ea typeface="+mn-ea"/>
+                <a:cs typeface="+mn-cs"/>
+              </a:rPr>
+              <a:t>the most important thing that has been learned about reinforcement learning over the</a:t>
+            </a:r>
+            <a:br>
+              <a:rPr lang="en-US" sz="1200" b="0" i="0" kern="1200" dirty="0">
+                <a:solidFill>
+                  <a:schemeClr val="tx1"/>
+                </a:solidFill>
+                <a:effectLst/>
+                <a:latin typeface="+mn-lt"/>
+                <a:ea typeface="+mn-ea"/>
+                <a:cs typeface="+mn-cs"/>
+              </a:rPr>
+            </a:br>
+            <a:r>
+              <a:rPr lang="en-US" sz="1200" b="0" i="0" kern="1200" dirty="0">
+                <a:solidFill>
+                  <a:schemeClr val="tx1"/>
+                </a:solidFill>
+                <a:effectLst/>
+                <a:latin typeface="+mn-lt"/>
+                <a:ea typeface="+mn-ea"/>
+                <a:cs typeface="+mn-cs"/>
+              </a:rPr>
+              <a:t>last six decades.</a:t>
+            </a:r>
+            <a:br>
+              <a:rPr lang="en-US" sz="1200" b="0" i="0" kern="1200" dirty="0">
+                <a:solidFill>
+                  <a:schemeClr val="tx1"/>
+                </a:solidFill>
+                <a:effectLst/>
+                <a:latin typeface="+mn-lt"/>
+                <a:ea typeface="+mn-ea"/>
+                <a:cs typeface="+mn-cs"/>
+              </a:rPr>
+            </a:br>
+            <a:r>
+              <a:rPr lang="en-US" sz="1200" b="0" i="0" kern="1200" dirty="0">
+                <a:solidFill>
+                  <a:schemeClr val="tx1"/>
+                </a:solidFill>
+                <a:effectLst/>
+                <a:latin typeface="+mn-lt"/>
+                <a:ea typeface="+mn-ea"/>
+                <a:cs typeface="+mn-cs"/>
+              </a:rPr>
+              <a:t>The fourth and final element of some reinforcement learning systems is a </a:t>
+            </a:r>
+            <a:r>
+              <a:rPr lang="en-US" sz="1200" b="0" i="1" kern="1200" dirty="0">
+                <a:solidFill>
+                  <a:schemeClr val="tx1"/>
+                </a:solidFill>
+                <a:effectLst/>
+                <a:latin typeface="+mn-lt"/>
+                <a:ea typeface="+mn-ea"/>
+                <a:cs typeface="+mn-cs"/>
+              </a:rPr>
+              <a:t>model </a:t>
+            </a:r>
+            <a:r>
+              <a:rPr lang="en-US" sz="1200" b="0" i="0" kern="1200" dirty="0">
+                <a:solidFill>
+                  <a:schemeClr val="tx1"/>
+                </a:solidFill>
+                <a:effectLst/>
+                <a:latin typeface="+mn-lt"/>
+                <a:ea typeface="+mn-ea"/>
+                <a:cs typeface="+mn-cs"/>
+              </a:rPr>
+              <a:t>of</a:t>
+            </a:r>
+            <a:br>
+              <a:rPr lang="en-US" sz="1200" b="0" i="0" kern="1200" dirty="0">
+                <a:solidFill>
+                  <a:schemeClr val="tx1"/>
+                </a:solidFill>
+                <a:effectLst/>
+                <a:latin typeface="+mn-lt"/>
+                <a:ea typeface="+mn-ea"/>
+                <a:cs typeface="+mn-cs"/>
+              </a:rPr>
+            </a:br>
+            <a:r>
+              <a:rPr lang="en-US" sz="1200" b="0" i="0" kern="1200" dirty="0">
+                <a:solidFill>
+                  <a:schemeClr val="tx1"/>
+                </a:solidFill>
+                <a:effectLst/>
+                <a:latin typeface="+mn-lt"/>
+                <a:ea typeface="+mn-ea"/>
+                <a:cs typeface="+mn-cs"/>
+              </a:rPr>
+              <a:t>the environment. This is something that mimics the behavior of the environment, or</a:t>
+            </a:r>
+            <a:br>
+              <a:rPr lang="en-US" sz="1200" b="0" i="0" kern="1200" dirty="0">
+                <a:solidFill>
+                  <a:schemeClr val="tx1"/>
+                </a:solidFill>
+                <a:effectLst/>
+                <a:latin typeface="+mn-lt"/>
+                <a:ea typeface="+mn-ea"/>
+                <a:cs typeface="+mn-cs"/>
+              </a:rPr>
+            </a:br>
+            <a:r>
+              <a:rPr lang="en-US" sz="1200" b="0" i="0" kern="1200" dirty="0">
+                <a:solidFill>
+                  <a:schemeClr val="tx1"/>
+                </a:solidFill>
+                <a:effectLst/>
+                <a:latin typeface="+mn-lt"/>
+                <a:ea typeface="+mn-ea"/>
+                <a:cs typeface="+mn-cs"/>
+              </a:rPr>
+              <a:t>more generally, that allows inferences to be made about how the environment will behave.</a:t>
+            </a:r>
+            <a:br>
+              <a:rPr lang="en-US" sz="1200" b="0" i="0" kern="1200" dirty="0">
+                <a:solidFill>
+                  <a:schemeClr val="tx1"/>
+                </a:solidFill>
+                <a:effectLst/>
+                <a:latin typeface="+mn-lt"/>
+                <a:ea typeface="+mn-ea"/>
+                <a:cs typeface="+mn-cs"/>
+              </a:rPr>
+            </a:br>
+            <a:r>
+              <a:rPr lang="en-US" sz="1200" b="0" i="0" kern="1200" dirty="0">
+                <a:solidFill>
+                  <a:schemeClr val="tx1"/>
+                </a:solidFill>
+                <a:effectLst/>
+                <a:latin typeface="+mn-lt"/>
+                <a:ea typeface="+mn-ea"/>
+                <a:cs typeface="+mn-cs"/>
+              </a:rPr>
+              <a:t>For example, given a state and action, the model might predict the resultant next state</a:t>
+            </a:r>
+            <a:br>
+              <a:rPr lang="en-US" sz="1200" b="0" i="0" kern="1200" dirty="0">
+                <a:solidFill>
+                  <a:schemeClr val="tx1"/>
+                </a:solidFill>
+                <a:effectLst/>
+                <a:latin typeface="+mn-lt"/>
+                <a:ea typeface="+mn-ea"/>
+                <a:cs typeface="+mn-cs"/>
+              </a:rPr>
+            </a:br>
+            <a:r>
+              <a:rPr lang="en-US" sz="1200" b="0" i="0" kern="1200" dirty="0">
+                <a:solidFill>
+                  <a:schemeClr val="tx1"/>
+                </a:solidFill>
+                <a:effectLst/>
+                <a:latin typeface="+mn-lt"/>
+                <a:ea typeface="+mn-ea"/>
+                <a:cs typeface="+mn-cs"/>
+              </a:rPr>
+              <a:t>and next reward. Models are used for </a:t>
+            </a:r>
+            <a:r>
+              <a:rPr lang="en-US" sz="1200" b="0" i="1" kern="1200" dirty="0">
+                <a:solidFill>
+                  <a:schemeClr val="tx1"/>
+                </a:solidFill>
+                <a:effectLst/>
+                <a:latin typeface="+mn-lt"/>
+                <a:ea typeface="+mn-ea"/>
+                <a:cs typeface="+mn-cs"/>
+              </a:rPr>
+              <a:t>planning</a:t>
+            </a:r>
+            <a:r>
+              <a:rPr lang="en-US" sz="1200" b="0" i="0" kern="1200" dirty="0">
+                <a:solidFill>
+                  <a:schemeClr val="tx1"/>
+                </a:solidFill>
+                <a:effectLst/>
+                <a:latin typeface="+mn-lt"/>
+                <a:ea typeface="+mn-ea"/>
+                <a:cs typeface="+mn-cs"/>
+              </a:rPr>
+              <a:t>, by which we mean any way of deciding</a:t>
+            </a:r>
+            <a:br>
+              <a:rPr lang="en-US" sz="1200" b="0" i="0" kern="1200" dirty="0">
+                <a:solidFill>
+                  <a:schemeClr val="tx1"/>
+                </a:solidFill>
+                <a:effectLst/>
+                <a:latin typeface="+mn-lt"/>
+                <a:ea typeface="+mn-ea"/>
+                <a:cs typeface="+mn-cs"/>
+              </a:rPr>
+            </a:br>
+            <a:r>
+              <a:rPr lang="en-US" sz="1200" b="0" i="0" kern="1200" dirty="0">
+                <a:solidFill>
+                  <a:schemeClr val="tx1"/>
+                </a:solidFill>
+                <a:effectLst/>
+                <a:latin typeface="+mn-lt"/>
+                <a:ea typeface="+mn-ea"/>
+                <a:cs typeface="+mn-cs"/>
+              </a:rPr>
+              <a:t>on a course of action by considering possible future situations before they are actually</a:t>
+            </a:r>
+            <a:br>
+              <a:rPr lang="en-US" sz="1200" b="0" i="0" kern="1200" dirty="0">
+                <a:solidFill>
+                  <a:schemeClr val="tx1"/>
+                </a:solidFill>
+                <a:effectLst/>
+                <a:latin typeface="+mn-lt"/>
+                <a:ea typeface="+mn-ea"/>
+                <a:cs typeface="+mn-cs"/>
+              </a:rPr>
+            </a:br>
+            <a:r>
+              <a:rPr lang="en-US" sz="1200" b="0" i="0" kern="1200" dirty="0">
+                <a:solidFill>
+                  <a:schemeClr val="tx1"/>
+                </a:solidFill>
+                <a:effectLst/>
+                <a:latin typeface="+mn-lt"/>
+                <a:ea typeface="+mn-ea"/>
+                <a:cs typeface="+mn-cs"/>
+              </a:rPr>
+              <a:t>experienced. Methods for solving reinforcement learning problems that use models and</a:t>
+            </a:r>
+            <a:br>
+              <a:rPr lang="en-US" sz="1200" b="0" i="0" kern="1200" dirty="0">
+                <a:solidFill>
+                  <a:schemeClr val="tx1"/>
+                </a:solidFill>
+                <a:effectLst/>
+                <a:latin typeface="+mn-lt"/>
+                <a:ea typeface="+mn-ea"/>
+                <a:cs typeface="+mn-cs"/>
+              </a:rPr>
+            </a:br>
+            <a:r>
+              <a:rPr lang="en-US" sz="1200" b="0" i="0" kern="1200" dirty="0">
+                <a:solidFill>
+                  <a:schemeClr val="tx1"/>
+                </a:solidFill>
+                <a:effectLst/>
+                <a:latin typeface="+mn-lt"/>
+                <a:ea typeface="+mn-ea"/>
+                <a:cs typeface="+mn-cs"/>
+              </a:rPr>
+              <a:t>planning are called </a:t>
+            </a:r>
+            <a:r>
+              <a:rPr lang="en-US" sz="1200" b="0" i="1" kern="1200" dirty="0">
+                <a:solidFill>
+                  <a:schemeClr val="tx1"/>
+                </a:solidFill>
+                <a:effectLst/>
+                <a:latin typeface="+mn-lt"/>
+                <a:ea typeface="+mn-ea"/>
+                <a:cs typeface="+mn-cs"/>
+              </a:rPr>
+              <a:t>model-based </a:t>
+            </a:r>
+            <a:r>
+              <a:rPr lang="en-US" sz="1200" b="0" i="0" kern="1200" dirty="0">
+                <a:solidFill>
+                  <a:schemeClr val="tx1"/>
+                </a:solidFill>
+                <a:effectLst/>
+                <a:latin typeface="+mn-lt"/>
+                <a:ea typeface="+mn-ea"/>
+                <a:cs typeface="+mn-cs"/>
+              </a:rPr>
+              <a:t>methods, as opposed to simpler </a:t>
+            </a:r>
+            <a:r>
+              <a:rPr lang="en-US" sz="1200" b="0" i="1" kern="1200" dirty="0">
+                <a:solidFill>
+                  <a:schemeClr val="tx1"/>
+                </a:solidFill>
+                <a:effectLst/>
+                <a:latin typeface="+mn-lt"/>
+                <a:ea typeface="+mn-ea"/>
+                <a:cs typeface="+mn-cs"/>
+              </a:rPr>
+              <a:t>model-free </a:t>
+            </a:r>
+            <a:r>
+              <a:rPr lang="en-US" sz="1200" b="0" i="0" kern="1200" dirty="0">
+                <a:solidFill>
+                  <a:schemeClr val="tx1"/>
+                </a:solidFill>
+                <a:effectLst/>
+                <a:latin typeface="+mn-lt"/>
+                <a:ea typeface="+mn-ea"/>
+                <a:cs typeface="+mn-cs"/>
+              </a:rPr>
+              <a:t>methods that</a:t>
+            </a:r>
+            <a:br>
+              <a:rPr lang="en-US" sz="1200" b="0" i="0" kern="1200" dirty="0">
+                <a:solidFill>
+                  <a:schemeClr val="tx1"/>
+                </a:solidFill>
+                <a:effectLst/>
+                <a:latin typeface="+mn-lt"/>
+                <a:ea typeface="+mn-ea"/>
+                <a:cs typeface="+mn-cs"/>
+              </a:rPr>
+            </a:br>
+            <a:r>
+              <a:rPr lang="en-US" sz="1200" b="0" i="0" kern="1200" dirty="0">
+                <a:solidFill>
+                  <a:schemeClr val="tx1"/>
+                </a:solidFill>
+                <a:effectLst/>
+                <a:latin typeface="+mn-lt"/>
+                <a:ea typeface="+mn-ea"/>
+                <a:cs typeface="+mn-cs"/>
+              </a:rPr>
+              <a:t>are explicitly trial-and-error learners—viewed as almost the </a:t>
+            </a:r>
+            <a:r>
+              <a:rPr lang="en-US" sz="1200" b="0" i="1" kern="1200" dirty="0">
+                <a:solidFill>
+                  <a:schemeClr val="tx1"/>
+                </a:solidFill>
+                <a:effectLst/>
+                <a:latin typeface="+mn-lt"/>
+                <a:ea typeface="+mn-ea"/>
+                <a:cs typeface="+mn-cs"/>
+              </a:rPr>
+              <a:t>opposite </a:t>
+            </a:r>
+            <a:r>
+              <a:rPr lang="en-US" sz="1200" b="0" i="0" kern="1200" dirty="0">
+                <a:solidFill>
+                  <a:schemeClr val="tx1"/>
+                </a:solidFill>
+                <a:effectLst/>
+                <a:latin typeface="+mn-lt"/>
+                <a:ea typeface="+mn-ea"/>
+                <a:cs typeface="+mn-cs"/>
+              </a:rPr>
+              <a:t>of planning. In</a:t>
+            </a:r>
+            <a:br>
+              <a:rPr lang="en-US" sz="1200" b="0" i="0" kern="1200" dirty="0">
+                <a:solidFill>
+                  <a:schemeClr val="tx1"/>
+                </a:solidFill>
+                <a:effectLst/>
+                <a:latin typeface="+mn-lt"/>
+                <a:ea typeface="+mn-ea"/>
+                <a:cs typeface="+mn-cs"/>
+              </a:rPr>
+            </a:br>
+            <a:r>
+              <a:rPr lang="en-US" sz="1200" b="0" i="0" kern="1200" dirty="0">
+                <a:solidFill>
+                  <a:schemeClr val="tx1"/>
+                </a:solidFill>
+                <a:effectLst/>
+                <a:latin typeface="+mn-lt"/>
+                <a:ea typeface="+mn-ea"/>
+                <a:cs typeface="+mn-cs"/>
+              </a:rPr>
+              <a:t>Chapter 8 we explore reinforcement learning systems that simultaneously learn by trial</a:t>
+            </a:r>
+            <a:br>
+              <a:rPr lang="en-US" sz="1200" b="0" i="0" kern="1200" dirty="0">
+                <a:solidFill>
+                  <a:schemeClr val="tx1"/>
+                </a:solidFill>
+                <a:effectLst/>
+                <a:latin typeface="+mn-lt"/>
+                <a:ea typeface="+mn-ea"/>
+                <a:cs typeface="+mn-cs"/>
+              </a:rPr>
+            </a:br>
+            <a:r>
+              <a:rPr lang="en-US" sz="1200" b="0" i="0" kern="1200" dirty="0">
+                <a:solidFill>
+                  <a:schemeClr val="tx1"/>
+                </a:solidFill>
+                <a:effectLst/>
+                <a:latin typeface="+mn-lt"/>
+                <a:ea typeface="+mn-ea"/>
+                <a:cs typeface="+mn-cs"/>
+              </a:rPr>
+              <a:t>and error, learn a model of the environment, and use the model for planning. Modern</a:t>
+            </a:r>
+            <a:br>
+              <a:rPr lang="en-US" sz="1200" b="0" i="0" kern="1200" dirty="0">
+                <a:solidFill>
+                  <a:schemeClr val="tx1"/>
+                </a:solidFill>
+                <a:effectLst/>
+                <a:latin typeface="+mn-lt"/>
+                <a:ea typeface="+mn-ea"/>
+                <a:cs typeface="+mn-cs"/>
+              </a:rPr>
+            </a:br>
+            <a:r>
+              <a:rPr lang="en-US" sz="1200" b="0" i="0" kern="1200" dirty="0">
+                <a:solidFill>
+                  <a:schemeClr val="tx1"/>
+                </a:solidFill>
+                <a:effectLst/>
+                <a:latin typeface="+mn-lt"/>
+                <a:ea typeface="+mn-ea"/>
+                <a:cs typeface="+mn-cs"/>
+              </a:rPr>
+              <a:t>reinforcement learning spans the spectrum from low-level, trial-and-error learning to</a:t>
+            </a:r>
+            <a:br>
+              <a:rPr lang="en-US" sz="1200" b="0" i="0" kern="1200" dirty="0">
+                <a:solidFill>
+                  <a:schemeClr val="tx1"/>
+                </a:solidFill>
+                <a:effectLst/>
+                <a:latin typeface="+mn-lt"/>
+                <a:ea typeface="+mn-ea"/>
+                <a:cs typeface="+mn-cs"/>
+              </a:rPr>
+            </a:br>
+            <a:r>
+              <a:rPr lang="en-US" sz="1200" b="0" i="0" kern="1200" dirty="0">
+                <a:solidFill>
+                  <a:schemeClr val="tx1"/>
+                </a:solidFill>
+                <a:effectLst/>
+                <a:latin typeface="+mn-lt"/>
+                <a:ea typeface="+mn-ea"/>
+                <a:cs typeface="+mn-cs"/>
+              </a:rPr>
+              <a:t>high-level, deliberative planning</a:t>
+            </a:r>
+            <a:r>
+              <a:rPr lang="en-US" dirty="0"/>
+              <a:t> </a:t>
+            </a:r>
+            <a:br>
+              <a:rPr lang="en-US" dirty="0"/>
+            </a:br>
+            <a:endParaRPr lang="en-US" dirty="0"/>
+          </a:p>
+        </p:txBody>
+      </p:sp>
+      <p:sp>
+        <p:nvSpPr>
+          <p:cNvPr id="4" name="Slide Number Placeholder 3"/>
+          <p:cNvSpPr>
+            <a:spLocks noGrp="1"/>
+          </p:cNvSpPr>
+          <p:nvPr>
+            <p:ph type="sldNum" sz="quarter" idx="5"/>
+          </p:nvPr>
+        </p:nvSpPr>
+        <p:spPr/>
+        <p:txBody>
+          <a:bodyPr/>
+          <a:lstStyle/>
+          <a:p>
+            <a:fld id="{1980DC7F-660A-4453-9840-44DB0AF8652B}" type="slidenum">
+              <a:rPr lang="en-US" smtClean="0"/>
+              <a:t>9</a:t>
+            </a:fld>
+            <a:endParaRPr lang="en-US"/>
+          </a:p>
+        </p:txBody>
+      </p:sp>
+    </p:spTree>
+    <p:extLst>
+      <p:ext uri="{BB962C8B-B14F-4D97-AF65-F5344CB8AC3E}">
+        <p14:creationId xmlns:p14="http://schemas.microsoft.com/office/powerpoint/2010/main" val="3562718904"/>
+      </p:ext>
+    </p:extLst>
+  </p:cSld>
+  <p:clrMapOvr>
+    <a:masterClrMapping/>
+  </p:clrMapOvr>
+</p:notes>
 </file>
 
 <file path=ppt/slideLayouts/slideLayout1.xml><?xml version="1.0" encoding="utf-8"?>
@@ -5749,8 +8068,19 @@
           <a:p>
             <a:r>
               <a:rPr lang="en-US" dirty="0"/>
-              <a:t>Data is labeled</a:t>
-            </a:r>
+              <a:t>which is typically about finding structure hidden in collections of</a:t>
+            </a:r>
+            <a:br>
+              <a:rPr lang="en-US" dirty="0"/>
+            </a:br>
+            <a:r>
+              <a:rPr lang="en-US" dirty="0"/>
+              <a:t>unlabeled data. </a:t>
+            </a:r>
+            <a:br>
+              <a:rPr lang="en-US" dirty="0"/>
+            </a:br>
+            <a:endParaRPr lang="en-US" dirty="0"/>
           </a:p>
         </p:txBody>
       </p:sp>
@@ -5844,8 +8174,26 @@
           <a:p>
             <a:r>
               <a:rPr lang="en-US" dirty="0"/>
-              <a:t>Data is labeled</a:t>
-            </a:r>
+              <a:t>Reinforcement learning is learning what to do—how to map situations to actions—so as to maximize a numerical reward signal. The learner is not told which actions to take, but instead must discover which actions yield the most reward by trying them. In the most interesting and challenging cases, actions may </a:t>
+            </a:r>
+            <a:r>
+              <a:rPr lang="en-US" dirty="0" err="1"/>
+              <a:t>a↵ect</a:t>
+            </a:r>
+            <a:r>
+              <a:rPr lang="en-US" dirty="0"/>
+              <a:t> not only the immediate reward but also the next situation and, through that, all subsequent rewards. These two characteristics—trial-and-error search and delayed reward—are the two most important distinguishing features of reinforcement learning.</a:t>
+            </a:r>
+          </a:p>
+          <a:p>
+            <a:r>
+              <a:rPr lang="en-US" dirty="0"/>
+              <a:t>Challenge: trade-off between exploration and exploitation. </a:t>
+            </a:r>
+            <a:br>
+              <a:rPr lang="en-US" dirty="0"/>
+            </a:br>
+            <a:endParaRPr lang="en-US" dirty="0"/>
           </a:p>
         </p:txBody>
       </p:sp>
@@ -5853,6 +8201,151 @@
     <p:extLst>
       <p:ext uri="{BB962C8B-B14F-4D97-AF65-F5344CB8AC3E}">
         <p14:creationId xmlns:p14="http://schemas.microsoft.com/office/powerpoint/2010/main" val="3055071703"/>
+      </p:ext>
+    </p:extLst>
+  </p:cSld>
+  <p:clrMapOvr>
+    <a:masterClrMapping/>
+  </p:clrMapOvr>
+</p:sld>
+</file>
+
+<file path=ppt/slides/slide9.xml><?xml version="1.0" encoding="utf-8"?>
+<p:sld xmlns:a="http://schemas.openxmlformats.org/drawingml/2006/main" xmlns:r="http://schemas.openxmlformats.org/officeDocument/2006/relationships" xmlns:p="http://schemas.openxmlformats.org/presentationml/2006/main">
+  <p:cSld>
+    <p:spTree>
+      <p:nvGrpSpPr>
+        <p:cNvPr id="1" name=""/>
+        <p:cNvGrpSpPr/>
+        <p:nvPr/>
+      </p:nvGrpSpPr>
+      <p:grpSpPr>
+        <a:xfrm>
+          <a:off x="0" y="0"/>
+          <a:ext cx="0" cy="0"/>
+          <a:chOff x="0" y="0"/>
+          <a:chExt cx="0" cy="0"/>
+        </a:xfrm>
+      </p:grpSpPr>
+      <p:sp>
+        <p:nvSpPr>
+          <p:cNvPr id="2" name="Title 1">
+            <a:extLst>
+              <a:ext uri="{FF2B5EF4-FFF2-40B4-BE49-F238E27FC236}">
+                <a16:creationId xmlns:a16="http://schemas.microsoft.com/office/drawing/2014/main" id="{49C7E59C-A2DC-4D30-A2BB-8937629D36A8}"/>
+              </a:ext>
+            </a:extLst>
+          </p:cNvPr>
+          <p:cNvSpPr>
+            <a:spLocks noGrp="1"/>
+          </p:cNvSpPr>
+          <p:nvPr>
+            <p:ph type="title"/>
+          </p:nvPr>
+        </p:nvSpPr>
+        <p:spPr/>
+        <p:txBody>
+          <a:bodyPr>
+            <a:normAutofit fontScale="90000"/>
+          </a:bodyPr>
+          <a:lstStyle/>
+          <a:p>
+            <a:r>
+              <a:rPr lang="en-US" dirty="0"/>
+              <a:t>Elements of Reinforcement Learning</a:t>
+            </a:r>
+            <a:br>
+              <a:rPr lang="en-US" dirty="0"/>
+            </a:br>
+            <a:endParaRPr lang="en-US" dirty="0"/>
+          </a:p>
+        </p:txBody>
+      </p:sp>
+      <p:sp>
+        <p:nvSpPr>
+          <p:cNvPr id="3" name="Content Placeholder 2">
+            <a:extLst>
+              <a:ext uri="{FF2B5EF4-FFF2-40B4-BE49-F238E27FC236}">
+                <a16:creationId xmlns:a16="http://schemas.microsoft.com/office/drawing/2014/main" id="{D3F1DDB2-39AE-4147-8B42-2946648BEC63}"/>
+              </a:ext>
+            </a:extLst>
+          </p:cNvPr>
+          <p:cNvSpPr>
+            <a:spLocks noGrp="1"/>
+          </p:cNvSpPr>
+          <p:nvPr>
+            <p:ph idx="1"/>
+          </p:nvPr>
+        </p:nvSpPr>
+        <p:spPr/>
+        <p:txBody>
+          <a:bodyPr/>
+          <a:lstStyle/>
+          <a:p>
+            <a:r>
+              <a:rPr lang="en-US" dirty="0"/>
+              <a:t>A </a:t>
+            </a:r>
+            <a:r>
+              <a:rPr lang="en-US" i="1" dirty="0"/>
+              <a:t>policy</a:t>
+            </a:r>
+            <a:r>
+              <a:rPr lang="en-US" dirty="0"/>
+              <a:t> </a:t>
+            </a:r>
+          </a:p>
+          <a:p>
+            <a:r>
+              <a:rPr lang="en-US" dirty="0"/>
+              <a:t>A </a:t>
+            </a:r>
+            <a:r>
+              <a:rPr lang="en-US" i="1" dirty="0"/>
+              <a:t>reward signal</a:t>
+            </a:r>
+            <a:r>
+              <a:rPr lang="en-US" dirty="0"/>
+              <a:t> defines the goal of a reinforcement learning problem, indicates what is good in an immediate sense</a:t>
+            </a:r>
+          </a:p>
+          <a:p>
+            <a:r>
+              <a:rPr lang="en-US" dirty="0"/>
+              <a:t>a </a:t>
+            </a:r>
+            <a:r>
+              <a:rPr lang="en-US" i="1" dirty="0"/>
+              <a:t>value function </a:t>
+            </a:r>
+            <a:r>
+              <a:rPr lang="en-US" dirty="0"/>
+              <a:t>specifies what is good in the long run </a:t>
+            </a:r>
+          </a:p>
+          <a:p>
+            <a:r>
+              <a:rPr lang="en-US" i="1" dirty="0"/>
+              <a:t>(optional) model </a:t>
+            </a:r>
+            <a:r>
+              <a:rPr lang="en-US" dirty="0"/>
+              <a:t>of the environment. </a:t>
+            </a:r>
+            <a:br>
+              <a:rPr lang="en-US" dirty="0"/>
+            </a:br>
+            <a:br>
+              <a:rPr lang="en-US" dirty="0"/>
+            </a:br>
+            <a:endParaRPr lang="en-US" dirty="0"/>
+          </a:p>
+        </p:txBody>
+      </p:sp>
+    </p:spTree>
+    <p:extLst>
+      <p:ext uri="{BB962C8B-B14F-4D97-AF65-F5344CB8AC3E}">
+        <p14:creationId xmlns:p14="http://schemas.microsoft.com/office/powerpoint/2010/main" val="2823832049"/>
       </p:ext>
     </p:extLst>
   </p:cSld>
@@ -6141,4 +8634,299 @@
     </a:ext>
   </a:extLst>
 </a:theme>
+</file>
+
+<file path=ppt/theme/theme2.xml><?xml version="1.0" encoding="utf-8"?>
+<a:theme xmlns:a="http://schemas.openxmlformats.org/drawingml/2006/main" name="Office Theme">
+  <a:themeElements>
+    <a:clrScheme name="Office">
+      <a:dk1>
+        <a:sysClr val="windowText" lastClr="000000"/>
+      </a:dk1>
+      <a:lt1>
+        <a:sysClr val="window" lastClr="FFFFFF"/>
+      </a:lt1>
+      <a:dk2>
+        <a:srgbClr val="44546A"/>
+      </a:dk2>
+      <a:lt2>
+        <a:srgbClr val="E7E6E6"/>
+      </a:lt2>
+      <a:accent1>
+        <a:srgbClr val="4472C4"/>
+      </a:accent1>
+      <a:accent2>
+        <a:srgbClr val="ED7D31"/>
+      </a:accent2>
+      <a:accent3>
+        <a:srgbClr val="A5A5A5"/>
+      </a:accent3>
+      <a:accent4>
+        <a:srgbClr val="FFC000"/>
+      </a:accent4>
+      <a:accent5>
+        <a:srgbClr val="5B9BD5"/>
+      </a:accent5>
+      <a:accent6>
+        <a:srgbClr val="70AD47"/>
+      </a:accent6>
+      <a:hlink>
+        <a:srgbClr val="0563C1"/>
+      </a:hlink>
+      <a:folHlink>
+        <a:srgbClr val="954F72"/>
+      </a:folHlink>
+    </a:clrScheme>
+    <a:fontScheme name="Office">
+      <a:majorFont>
+        <a:latin typeface="Calibri Light" panose="020F0302020204030204"/>
+        <a:ea typeface=""/>
+        <a:cs typeface=""/>
+        <a:font script="Jpan" typeface="游ゴシック Light"/>
+        <a:font script="Hang" typeface="맑은 고딕"/>
+        <a:font script="Hans" typeface="等线 Light"/>
+        <a:font script="Hant" typeface="新細明體"/>
+        <a:font script="Arab" typeface="Times New Roman"/>
+        <a:font script="Hebr" typeface="Times New Roman"/>
+        <a:font script="Thai" typeface="Angsana New"/>
+        <a:font script="Ethi" typeface="Nyala"/>
+        <a:font script="Beng" typeface="Vrinda"/>
+        <a:font script="Gujr" typeface="Shruti"/>
+        <a:font script="Khmr" typeface="MoolBoran"/>
+        <a:font script="Knda" typeface="Tunga"/>
+        <a:font script="Guru" typeface="Raavi"/>
+        <a:font script="Cans" typeface="Euphemia"/>
+        <a:font script="Cher" typeface="Plantagenet Cherokee"/>
+        <a:font script="Yiii" typeface="Microsoft Yi Baiti"/>
+        <a:font script="Tibt" typeface="Microsoft Himalaya"/>
+        <a:font script="Thaa" typeface="MV Boli"/>
+        <a:font script="Deva" typeface="Mangal"/>
+        <a:font script="Telu" typeface="Gautami"/>
+        <a:font script="Taml" typeface="Latha"/>
+        <a:font script="Syrc" typeface="Estrangelo Edessa"/>
+        <a:font script="Orya" typeface="Kalinga"/>
+        <a:font script="Mlym" typeface="Kartika"/>
+        <a:font script="Laoo" typeface="DokChampa"/>
+        <a:font script="Sinh" typeface="Iskoola Pota"/>
+        <a:font script="Mong" typeface="Mongolian Baiti"/>
+        <a:font script="Viet" typeface="Times New Roman"/>
+        <a:font script="Uigh" typeface="Microsoft Uighur"/>
+        <a:font script="Geor" typeface="Sylfaen"/>
+        <a:font script="Armn" typeface="Arial"/>
+        <a:font script="Bugi" typeface="Leelawadee UI"/>
+        <a:font script="Bopo" typeface="Microsoft JhengHei"/>
+        <a:font script="Java" typeface="Javanese Text"/>
+        <a:font script="Lisu" typeface="Segoe UI"/>
+        <a:font script="Mymr" typeface="Myanmar Text"/>
+        <a:font script="Nkoo" typeface="Ebrima"/>
+        <a:font script="Olck" typeface="Nirmala UI"/>
+        <a:font script="Osma" typeface="Ebrima"/>
+        <a:font script="Phag" typeface="Phagspa"/>
+        <a:font script="Syrn" typeface="Estrangelo Edessa"/>
+        <a:font script="Syrj" typeface="Estrangelo Edessa"/>
+        <a:font script="Syre" typeface="Estrangelo Edessa"/>
+        <a:font script="Sora" typeface="Nirmala UI"/>
+        <a:font script="Tale" typeface="Microsoft Tai Le"/>
+        <a:font script="Talu" typeface="Microsoft New Tai Lue"/>
+        <a:font script="Tfng" typeface="Ebrima"/>
+      </a:majorFont>
+      <a:minorFont>
+        <a:latin typeface="Calibri" panose="020F0502020204030204"/>
+        <a:ea typeface=""/>
+        <a:cs typeface=""/>
+        <a:font script="Jpan" typeface="游ゴシック"/>
+        <a:font script="Hang" typeface="맑은 고딕"/>
+        <a:font script="Hans" typeface="等线"/>
+        <a:font script="Hant" typeface="新細明體"/>
+        <a:font script="Arab" typeface="Arial"/>
+        <a:font script="Hebr" typeface="Arial"/>
+        <a:font script="Thai" typeface="Cordia New"/>
+        <a:font script="Ethi" typeface="Nyala"/>
+        <a:font script="Beng" typeface="Vrinda"/>
+        <a:font script="Gujr" typeface="Shruti"/>
+        <a:font script="Khmr" typeface="DaunPenh"/>
+        <a:font script="Knda" typeface="Tunga"/>
+        <a:font script="Guru" typeface="Raavi"/>
+        <a:font script="Cans" typeface="Euphemia"/>
+        <a:font script="Cher" typeface="Plantagenet Cherokee"/>
+        <a:font script="Yiii" typeface="Microsoft Yi Baiti"/>
+        <a:font script="Tibt" typeface="Microsoft Himalaya"/>
+        <a:font script="Thaa" typeface="MV Boli"/>
+        <a:font script="Deva" typeface="Mangal"/>
+        <a:font script="Telu" typeface="Gautami"/>
+        <a:font script="Taml" typeface="Latha"/>
+        <a:font script="Syrc" typeface="Estrangelo Edessa"/>
+        <a:font script="Orya" typeface="Kalinga"/>
+        <a:font script="Mlym" typeface="Kartika"/>
+        <a:font script="Laoo" typeface="DokChampa"/>
+        <a:font script="Sinh" typeface="Iskoola Pota"/>
+        <a:font script="Mong" typeface="Mongolian Baiti"/>
+        <a:font script="Viet" typeface="Arial"/>
+        <a:font script="Uigh" typeface="Microsoft Uighur"/>
+        <a:font script="Geor" typeface="Sylfaen"/>
+        <a:font script="Armn" typeface="Arial"/>
+        <a:font script="Bugi" typeface="Leelawadee UI"/>
+        <a:font script="Bopo" typeface="Microsoft JhengHei"/>
+        <a:font script="Java" typeface="Javanese Text"/>
+        <a:font script="Lisu" typeface="Segoe UI"/>
+        <a:font script="Mymr" typeface="Myanmar Text"/>
+        <a:font script="Nkoo" typeface="Ebrima"/>
+        <a:font script="Olck" typeface="Nirmala UI"/>
+        <a:font script="Osma" typeface="Ebrima"/>
+        <a:font script="Phag" typeface="Phagspa"/>
+        <a:font script="Syrn" typeface="Estrangelo Edessa"/>
+        <a:font script="Syrj" typeface="Estrangelo Edessa"/>
+        <a:font script="Syre" typeface="Estrangelo Edessa"/>
+        <a:font script="Sora" typeface="Nirmala UI"/>
+        <a:font script="Tale" typeface="Microsoft Tai Le"/>
+        <a:font script="Talu" typeface="Microsoft New Tai Lue"/>
+        <a:font script="Tfng" typeface="Ebrima"/>
+      </a:minorFont>
+    </a:fontScheme>
+    <a:fmtScheme name="Office">
+      <a:fillStyleLst>
+        <a:solidFill>
+          <a:schemeClr val="phClr"/>
+        </a:solidFill>
+        <a:gradFill rotWithShape="1">
+          <a:gsLst>
+            <a:gs pos="0">
+              <a:schemeClr val="phClr">
+                <a:lumMod val="110000"/>
+                <a:satMod val="105000"/>
+                <a:tint val="67000"/>
+              </a:schemeClr>
+            </a:gs>
+            <a:gs pos="50000">
+              <a:schemeClr val="phClr">
+                <a:lumMod val="105000"/>
+                <a:satMod val="103000"/>
+                <a:tint val="73000"/>
+              </a:schemeClr>
+            </a:gs>
+            <a:gs pos="100000">
+              <a:schemeClr val="phClr">
+                <a:lumMod val="105000"/>
+                <a:satMod val="109000"/>
+                <a:tint val="81000"/>
+              </a:schemeClr>
+            </a:gs>
+          </a:gsLst>
+          <a:lin ang="5400000" scaled="0"/>
+        </a:gradFill>
+        <a:gradFill rotWithShape="1">
+          <a:gsLst>
+            <a:gs pos="0">
+              <a:schemeClr val="phClr">
+                <a:satMod val="103000"/>
+                <a:lumMod val="102000"/>
+                <a:tint val="94000"/>
+              </a:schemeClr>
+            </a:gs>
+            <a:gs pos="50000">
+              <a:schemeClr val="phClr">
+                <a:satMod val="110000"/>
+                <a:lumMod val="100000"/>
+                <a:shade val="100000"/>
+              </a:schemeClr>
+            </a:gs>
+            <a:gs pos="100000">
+              <a:schemeClr val="phClr">
+                <a:lumMod val="99000"/>
+                <a:satMod val="120000"/>
+                <a:shade val="78000"/>
+              </a:schemeClr>
+            </a:gs>
+          </a:gsLst>
+          <a:lin ang="5400000" scaled="0"/>
+        </a:gradFill>
+      </a:fillStyleLst>
+      <a:lnStyleLst>
+        <a:ln w="6350" cap="flat" cmpd="sng" algn="ctr">
+          <a:solidFill>
+            <a:schemeClr val="phClr"/>
+          </a:solidFill>
+          <a:prstDash val="solid"/>
+          <a:miter lim="800000"/>
+        </a:ln>
+        <a:ln w="12700" cap="flat" cmpd="sng" algn="ctr">
+          <a:solidFill>
+            <a:schemeClr val="phClr"/>
+          </a:solidFill>
+          <a:prstDash val="solid"/>
+          <a:miter lim="800000"/>
+        </a:ln>
+        <a:ln w="19050" cap="flat" cmpd="sng" algn="ctr">
+          <a:solidFill>
+            <a:schemeClr val="phClr"/>
+          </a:solidFill>
+          <a:prstDash val="solid"/>
+          <a:miter lim="800000"/>
+        </a:ln>
+      </a:lnStyleLst>
+      <a:effectStyleLst>
+        <a:effectStyle>
+          <a:effectLst/>
+        </a:effectStyle>
+        <a:effectStyle>
+          <a:effectLst/>
+        </a:effectStyle>
+        <a:effectStyle>
+          <a:effectLst>
+            <a:outerShdw blurRad="57150" dist="19050" dir="5400000" algn="ctr" rotWithShape="0">
+              <a:srgbClr val="000000">
+                <a:alpha val="63000"/>
+              </a:srgbClr>
+            </a:outerShdw>
+          </a:effectLst>
+        </a:effectStyle>
+      </a:effectStyleLst>
+      <a:bgFillStyleLst>
+        <a:solidFill>
+          <a:schemeClr val="phClr"/>
+        </a:solidFill>
+        <a:solidFill>
+          <a:schemeClr val="phClr">
+            <a:tint val="95000"/>
+            <a:satMod val="170000"/>
+          </a:schemeClr>
+        </a:solidFill>
+        <a:gradFill rotWithShape="1">
+          <a:gsLst>
+            <a:gs pos="0">
+              <a:schemeClr val="phClr">
+                <a:tint val="93000"/>
+                <a:satMod val="150000"/>
+                <a:shade val="98000"/>
+                <a:lumMod val="102000"/>
+              </a:schemeClr>
+            </a:gs>
+            <a:gs pos="50000">
+              <a:schemeClr val="phClr">
+                <a:tint val="98000"/>
+                <a:satMod val="130000"/>
+                <a:shade val="90000"/>
+                <a:lumMod val="103000"/>
+              </a:schemeClr>
+            </a:gs>
+            <a:gs pos="100000">
+              <a:schemeClr val="phClr">
+                <a:shade val="63000"/>
+                <a:satMod val="120000"/>
+              </a:schemeClr>
+            </a:gs>
+          </a:gsLst>
+          <a:lin ang="5400000" scaled="0"/>
+        </a:gradFill>
+      </a:bgFillStyleLst>
+    </a:fmtScheme>
+  </a:themeElements>
+  <a:objectDefaults/>
+  <a:extraClrSchemeLst/>
+  <a:extLst>
+    <a:ext uri="{05A4C25C-085E-4340-85A3-A5531E510DB2}">
+      <thm15:themeFamily xmlns:thm15="http://schemas.microsoft.com/office/thememl/2012/main" name="Office Theme" id="{62F939B6-93AF-4DB8-9C6B-D6C7DFDC589F}" vid="{4A3C46E8-61CC-4603-A589-7422A47A8E4A}"/>
+    </a:ext>
+  </a:extLst>
+</a:theme>
 </file>
</xml_diff>